<commit_message>
finish project report ppt
</commit_message>
<xml_diff>
--- a/doc/大作业汇报.pptx
+++ b/doc/大作业汇报.pptx
@@ -4,20 +4,28 @@
   <p:sldMasterIdLst>
     <p:sldMasterId id="2147483660" r:id="rId1"/>
   </p:sldMasterIdLst>
+  <p:notesMasterIdLst>
+    <p:notesMasterId r:id="rId20"/>
+  </p:notesMasterIdLst>
   <p:sldIdLst>
     <p:sldId id="256" r:id="rId2"/>
     <p:sldId id="257" r:id="rId3"/>
     <p:sldId id="258" r:id="rId4"/>
     <p:sldId id="259" r:id="rId5"/>
-    <p:sldId id="268" r:id="rId6"/>
-    <p:sldId id="260" r:id="rId7"/>
-    <p:sldId id="261" r:id="rId8"/>
-    <p:sldId id="263" r:id="rId9"/>
-    <p:sldId id="264" r:id="rId10"/>
-    <p:sldId id="262" r:id="rId11"/>
-    <p:sldId id="265" r:id="rId12"/>
-    <p:sldId id="266" r:id="rId13"/>
-    <p:sldId id="267" r:id="rId14"/>
+    <p:sldId id="260" r:id="rId6"/>
+    <p:sldId id="269" r:id="rId7"/>
+    <p:sldId id="270" r:id="rId8"/>
+    <p:sldId id="261" r:id="rId9"/>
+    <p:sldId id="263" r:id="rId10"/>
+    <p:sldId id="264" r:id="rId11"/>
+    <p:sldId id="271" r:id="rId12"/>
+    <p:sldId id="272" r:id="rId13"/>
+    <p:sldId id="274" r:id="rId14"/>
+    <p:sldId id="275" r:id="rId15"/>
+    <p:sldId id="273" r:id="rId16"/>
+    <p:sldId id="265" r:id="rId17"/>
+    <p:sldId id="266" r:id="rId18"/>
+    <p:sldId id="267" r:id="rId19"/>
   </p:sldIdLst>
   <p:sldSz cx="9144000" cy="6858000" type="screen4x3"/>
   <p:notesSz cx="6858000" cy="9144000"/>
@@ -119,6 +127,440 @@
 </p:presentation>
 </file>
 
+<file path=ppt/notesMasters/notesMaster1.xml><?xml version="1.0" encoding="utf-8"?>
+<p:notesMaster xmlns:a="http://schemas.openxmlformats.org/drawingml/2006/main" xmlns:r="http://schemas.openxmlformats.org/officeDocument/2006/relationships" xmlns:p="http://schemas.openxmlformats.org/presentationml/2006/main">
+  <p:cSld>
+    <p:bg>
+      <p:bgRef idx="1001">
+        <a:schemeClr val="bg1"/>
+      </p:bgRef>
+    </p:bg>
+    <p:spTree>
+      <p:nvGrpSpPr>
+        <p:cNvPr id="1" name=""/>
+        <p:cNvGrpSpPr/>
+        <p:nvPr/>
+      </p:nvGrpSpPr>
+      <p:grpSpPr>
+        <a:xfrm>
+          <a:off x="0" y="0"/>
+          <a:ext cx="0" cy="0"/>
+          <a:chOff x="0" y="0"/>
+          <a:chExt cx="0" cy="0"/>
+        </a:xfrm>
+      </p:grpSpPr>
+      <p:sp>
+        <p:nvSpPr>
+          <p:cNvPr id="2" name="页眉占位符 1"/>
+          <p:cNvSpPr>
+            <a:spLocks noGrp="1"/>
+          </p:cNvSpPr>
+          <p:nvPr>
+            <p:ph type="hdr" sz="quarter"/>
+          </p:nvPr>
+        </p:nvSpPr>
+        <p:spPr>
+          <a:xfrm>
+            <a:off x="0" y="0"/>
+            <a:ext cx="2971800" cy="457200"/>
+          </a:xfrm>
+          <a:prstGeom prst="rect">
+            <a:avLst/>
+          </a:prstGeom>
+        </p:spPr>
+        <p:txBody>
+          <a:bodyPr vert="horz" lIns="91440" tIns="45720" rIns="91440" bIns="45720" rtlCol="0"/>
+          <a:lstStyle>
+            <a:lvl1pPr algn="l">
+              <a:defRPr sz="1200"/>
+            </a:lvl1pPr>
+          </a:lstStyle>
+          <a:p>
+            <a:endParaRPr lang="zh-CN" altLang="en-US"/>
+          </a:p>
+        </p:txBody>
+      </p:sp>
+      <p:sp>
+        <p:nvSpPr>
+          <p:cNvPr id="3" name="日期占位符 2"/>
+          <p:cNvSpPr>
+            <a:spLocks noGrp="1"/>
+          </p:cNvSpPr>
+          <p:nvPr>
+            <p:ph type="dt" idx="1"/>
+          </p:nvPr>
+        </p:nvSpPr>
+        <p:spPr>
+          <a:xfrm>
+            <a:off x="3884613" y="0"/>
+            <a:ext cx="2971800" cy="457200"/>
+          </a:xfrm>
+          <a:prstGeom prst="rect">
+            <a:avLst/>
+          </a:prstGeom>
+        </p:spPr>
+        <p:txBody>
+          <a:bodyPr vert="horz" lIns="91440" tIns="45720" rIns="91440" bIns="45720" rtlCol="0"/>
+          <a:lstStyle>
+            <a:lvl1pPr algn="r">
+              <a:defRPr sz="1200"/>
+            </a:lvl1pPr>
+          </a:lstStyle>
+          <a:p>
+            <a:fld id="{7ABBA65B-1FFE-4594-BF47-7F3A119FACA8}" type="datetimeFigureOut">
+              <a:rPr lang="zh-CN" altLang="en-US" smtClean="0"/>
+              <a:t>2013/5/28</a:t>
+            </a:fld>
+            <a:endParaRPr lang="zh-CN" altLang="en-US"/>
+          </a:p>
+        </p:txBody>
+      </p:sp>
+      <p:sp>
+        <p:nvSpPr>
+          <p:cNvPr id="4" name="幻灯片图像占位符 3"/>
+          <p:cNvSpPr>
+            <a:spLocks noGrp="1" noRot="1" noChangeAspect="1"/>
+          </p:cNvSpPr>
+          <p:nvPr>
+            <p:ph type="sldImg" idx="2"/>
+          </p:nvPr>
+        </p:nvSpPr>
+        <p:spPr>
+          <a:xfrm>
+            <a:off x="1143000" y="685800"/>
+            <a:ext cx="4572000" cy="3429000"/>
+          </a:xfrm>
+          <a:prstGeom prst="rect">
+            <a:avLst/>
+          </a:prstGeom>
+          <a:noFill/>
+          <a:ln w="12700">
+            <a:solidFill>
+              <a:prstClr val="black"/>
+            </a:solidFill>
+          </a:ln>
+        </p:spPr>
+        <p:txBody>
+          <a:bodyPr vert="horz" lIns="91440" tIns="45720" rIns="91440" bIns="45720" rtlCol="0" anchor="ctr"/>
+          <a:lstStyle/>
+          <a:p>
+            <a:endParaRPr lang="zh-CN" altLang="en-US"/>
+          </a:p>
+        </p:txBody>
+      </p:sp>
+      <p:sp>
+        <p:nvSpPr>
+          <p:cNvPr id="5" name="备注占位符 4"/>
+          <p:cNvSpPr>
+            <a:spLocks noGrp="1"/>
+          </p:cNvSpPr>
+          <p:nvPr>
+            <p:ph type="body" sz="quarter" idx="3"/>
+          </p:nvPr>
+        </p:nvSpPr>
+        <p:spPr>
+          <a:xfrm>
+            <a:off x="685800" y="4343400"/>
+            <a:ext cx="5486400" cy="4114800"/>
+          </a:xfrm>
+          <a:prstGeom prst="rect">
+            <a:avLst/>
+          </a:prstGeom>
+        </p:spPr>
+        <p:txBody>
+          <a:bodyPr vert="horz" lIns="91440" tIns="45720" rIns="91440" bIns="45720" rtlCol="0"/>
+          <a:lstStyle/>
+          <a:p>
+            <a:pPr lvl="0"/>
+            <a:r>
+              <a:rPr lang="zh-CN" altLang="en-US" smtClean="0"/>
+              <a:t>单击此处编辑母版文本样式</a:t>
+            </a:r>
+          </a:p>
+          <a:p>
+            <a:pPr lvl="1"/>
+            <a:r>
+              <a:rPr lang="zh-CN" altLang="en-US" smtClean="0"/>
+              <a:t>第二级</a:t>
+            </a:r>
+          </a:p>
+          <a:p>
+            <a:pPr lvl="2"/>
+            <a:r>
+              <a:rPr lang="zh-CN" altLang="en-US" smtClean="0"/>
+              <a:t>第三级</a:t>
+            </a:r>
+          </a:p>
+          <a:p>
+            <a:pPr lvl="3"/>
+            <a:r>
+              <a:rPr lang="zh-CN" altLang="en-US" smtClean="0"/>
+              <a:t>第四级</a:t>
+            </a:r>
+          </a:p>
+          <a:p>
+            <a:pPr lvl="4"/>
+            <a:r>
+              <a:rPr lang="zh-CN" altLang="en-US" smtClean="0"/>
+              <a:t>第五级</a:t>
+            </a:r>
+            <a:endParaRPr lang="zh-CN" altLang="en-US"/>
+          </a:p>
+        </p:txBody>
+      </p:sp>
+      <p:sp>
+        <p:nvSpPr>
+          <p:cNvPr id="6" name="页脚占位符 5"/>
+          <p:cNvSpPr>
+            <a:spLocks noGrp="1"/>
+          </p:cNvSpPr>
+          <p:nvPr>
+            <p:ph type="ftr" sz="quarter" idx="4"/>
+          </p:nvPr>
+        </p:nvSpPr>
+        <p:spPr>
+          <a:xfrm>
+            <a:off x="0" y="8685213"/>
+            <a:ext cx="2971800" cy="457200"/>
+          </a:xfrm>
+          <a:prstGeom prst="rect">
+            <a:avLst/>
+          </a:prstGeom>
+        </p:spPr>
+        <p:txBody>
+          <a:bodyPr vert="horz" lIns="91440" tIns="45720" rIns="91440" bIns="45720" rtlCol="0" anchor="b"/>
+          <a:lstStyle>
+            <a:lvl1pPr algn="l">
+              <a:defRPr sz="1200"/>
+            </a:lvl1pPr>
+          </a:lstStyle>
+          <a:p>
+            <a:endParaRPr lang="zh-CN" altLang="en-US"/>
+          </a:p>
+        </p:txBody>
+      </p:sp>
+      <p:sp>
+        <p:nvSpPr>
+          <p:cNvPr id="7" name="灯片编号占位符 6"/>
+          <p:cNvSpPr>
+            <a:spLocks noGrp="1"/>
+          </p:cNvSpPr>
+          <p:nvPr>
+            <p:ph type="sldNum" sz="quarter" idx="5"/>
+          </p:nvPr>
+        </p:nvSpPr>
+        <p:spPr>
+          <a:xfrm>
+            <a:off x="3884613" y="8685213"/>
+            <a:ext cx="2971800" cy="457200"/>
+          </a:xfrm>
+          <a:prstGeom prst="rect">
+            <a:avLst/>
+          </a:prstGeom>
+        </p:spPr>
+        <p:txBody>
+          <a:bodyPr vert="horz" lIns="91440" tIns="45720" rIns="91440" bIns="45720" rtlCol="0" anchor="b"/>
+          <a:lstStyle>
+            <a:lvl1pPr algn="r">
+              <a:defRPr sz="1200"/>
+            </a:lvl1pPr>
+          </a:lstStyle>
+          <a:p>
+            <a:fld id="{BA466208-0A79-46B9-867D-62F27AABAC82}" type="slidenum">
+              <a:rPr lang="zh-CN" altLang="en-US" smtClean="0"/>
+              <a:t>‹#›</a:t>
+            </a:fld>
+            <a:endParaRPr lang="zh-CN" altLang="en-US"/>
+          </a:p>
+        </p:txBody>
+      </p:sp>
+    </p:spTree>
+    <p:extLst>
+      <p:ext uri="{BB962C8B-B14F-4D97-AF65-F5344CB8AC3E}">
+        <p14:creationId xmlns:p14="http://schemas.microsoft.com/office/powerpoint/2010/main" val="1598855665"/>
+      </p:ext>
+    </p:extLst>
+  </p:cSld>
+  <p:clrMap bg1="lt1" tx1="dk1" bg2="lt2" tx2="dk2" accent1="accent1" accent2="accent2" accent3="accent3" accent4="accent4" accent5="accent5" accent6="accent6" hlink="hlink" folHlink="folHlink"/>
+  <p:notesStyle>
+    <a:lvl1pPr marL="0" algn="l" defTabSz="914400" rtl="0" eaLnBrk="1" latinLnBrk="0" hangingPunct="1">
+      <a:defRPr sz="1200" kern="1200">
+        <a:solidFill>
+          <a:schemeClr val="tx1"/>
+        </a:solidFill>
+        <a:latin typeface="+mn-lt"/>
+        <a:ea typeface="+mn-ea"/>
+        <a:cs typeface="+mn-cs"/>
+      </a:defRPr>
+    </a:lvl1pPr>
+    <a:lvl2pPr marL="457200" algn="l" defTabSz="914400" rtl="0" eaLnBrk="1" latinLnBrk="0" hangingPunct="1">
+      <a:defRPr sz="1200" kern="1200">
+        <a:solidFill>
+          <a:schemeClr val="tx1"/>
+        </a:solidFill>
+        <a:latin typeface="+mn-lt"/>
+        <a:ea typeface="+mn-ea"/>
+        <a:cs typeface="+mn-cs"/>
+      </a:defRPr>
+    </a:lvl2pPr>
+    <a:lvl3pPr marL="914400" algn="l" defTabSz="914400" rtl="0" eaLnBrk="1" latinLnBrk="0" hangingPunct="1">
+      <a:defRPr sz="1200" kern="1200">
+        <a:solidFill>
+          <a:schemeClr val="tx1"/>
+        </a:solidFill>
+        <a:latin typeface="+mn-lt"/>
+        <a:ea typeface="+mn-ea"/>
+        <a:cs typeface="+mn-cs"/>
+      </a:defRPr>
+    </a:lvl3pPr>
+    <a:lvl4pPr marL="1371600" algn="l" defTabSz="914400" rtl="0" eaLnBrk="1" latinLnBrk="0" hangingPunct="1">
+      <a:defRPr sz="1200" kern="1200">
+        <a:solidFill>
+          <a:schemeClr val="tx1"/>
+        </a:solidFill>
+        <a:latin typeface="+mn-lt"/>
+        <a:ea typeface="+mn-ea"/>
+        <a:cs typeface="+mn-cs"/>
+      </a:defRPr>
+    </a:lvl4pPr>
+    <a:lvl5pPr marL="1828800" algn="l" defTabSz="914400" rtl="0" eaLnBrk="1" latinLnBrk="0" hangingPunct="1">
+      <a:defRPr sz="1200" kern="1200">
+        <a:solidFill>
+          <a:schemeClr val="tx1"/>
+        </a:solidFill>
+        <a:latin typeface="+mn-lt"/>
+        <a:ea typeface="+mn-ea"/>
+        <a:cs typeface="+mn-cs"/>
+      </a:defRPr>
+    </a:lvl5pPr>
+    <a:lvl6pPr marL="2286000" algn="l" defTabSz="914400" rtl="0" eaLnBrk="1" latinLnBrk="0" hangingPunct="1">
+      <a:defRPr sz="1200" kern="1200">
+        <a:solidFill>
+          <a:schemeClr val="tx1"/>
+        </a:solidFill>
+        <a:latin typeface="+mn-lt"/>
+        <a:ea typeface="+mn-ea"/>
+        <a:cs typeface="+mn-cs"/>
+      </a:defRPr>
+    </a:lvl6pPr>
+    <a:lvl7pPr marL="2743200" algn="l" defTabSz="914400" rtl="0" eaLnBrk="1" latinLnBrk="0" hangingPunct="1">
+      <a:defRPr sz="1200" kern="1200">
+        <a:solidFill>
+          <a:schemeClr val="tx1"/>
+        </a:solidFill>
+        <a:latin typeface="+mn-lt"/>
+        <a:ea typeface="+mn-ea"/>
+        <a:cs typeface="+mn-cs"/>
+      </a:defRPr>
+    </a:lvl7pPr>
+    <a:lvl8pPr marL="3200400" algn="l" defTabSz="914400" rtl="0" eaLnBrk="1" latinLnBrk="0" hangingPunct="1">
+      <a:defRPr sz="1200" kern="1200">
+        <a:solidFill>
+          <a:schemeClr val="tx1"/>
+        </a:solidFill>
+        <a:latin typeface="+mn-lt"/>
+        <a:ea typeface="+mn-ea"/>
+        <a:cs typeface="+mn-cs"/>
+      </a:defRPr>
+    </a:lvl8pPr>
+    <a:lvl9pPr marL="3657600" algn="l" defTabSz="914400" rtl="0" eaLnBrk="1" latinLnBrk="0" hangingPunct="1">
+      <a:defRPr sz="1200" kern="1200">
+        <a:solidFill>
+          <a:schemeClr val="tx1"/>
+        </a:solidFill>
+        <a:latin typeface="+mn-lt"/>
+        <a:ea typeface="+mn-ea"/>
+        <a:cs typeface="+mn-cs"/>
+      </a:defRPr>
+    </a:lvl9pPr>
+  </p:notesStyle>
+</p:notesMaster>
+</file>
+
+<file path=ppt/notesSlides/notesSlide1.xml><?xml version="1.0" encoding="utf-8"?>
+<p:notes xmlns:a="http://schemas.openxmlformats.org/drawingml/2006/main" xmlns:r="http://schemas.openxmlformats.org/officeDocument/2006/relationships" xmlns:p="http://schemas.openxmlformats.org/presentationml/2006/main">
+  <p:cSld>
+    <p:spTree>
+      <p:nvGrpSpPr>
+        <p:cNvPr id="1" name=""/>
+        <p:cNvGrpSpPr/>
+        <p:nvPr/>
+      </p:nvGrpSpPr>
+      <p:grpSpPr>
+        <a:xfrm>
+          <a:off x="0" y="0"/>
+          <a:ext cx="0" cy="0"/>
+          <a:chOff x="0" y="0"/>
+          <a:chExt cx="0" cy="0"/>
+        </a:xfrm>
+      </p:grpSpPr>
+      <p:sp>
+        <p:nvSpPr>
+          <p:cNvPr id="2" name="幻灯片图像占位符 1"/>
+          <p:cNvSpPr>
+            <a:spLocks noGrp="1" noRot="1" noChangeAspect="1"/>
+          </p:cNvSpPr>
+          <p:nvPr>
+            <p:ph type="sldImg"/>
+          </p:nvPr>
+        </p:nvSpPr>
+        <p:spPr/>
+      </p:sp>
+      <p:sp>
+        <p:nvSpPr>
+          <p:cNvPr id="3" name="备注占位符 2"/>
+          <p:cNvSpPr>
+            <a:spLocks noGrp="1"/>
+          </p:cNvSpPr>
+          <p:nvPr>
+            <p:ph type="body" idx="1"/>
+          </p:nvPr>
+        </p:nvSpPr>
+        <p:spPr/>
+        <p:txBody>
+          <a:bodyPr/>
+          <a:lstStyle/>
+          <a:p>
+            <a:endParaRPr lang="zh-CN" altLang="en-US" dirty="0"/>
+          </a:p>
+        </p:txBody>
+      </p:sp>
+      <p:sp>
+        <p:nvSpPr>
+          <p:cNvPr id="4" name="灯片编号占位符 3"/>
+          <p:cNvSpPr>
+            <a:spLocks noGrp="1"/>
+          </p:cNvSpPr>
+          <p:nvPr>
+            <p:ph type="sldNum" sz="quarter" idx="10"/>
+          </p:nvPr>
+        </p:nvSpPr>
+        <p:spPr/>
+        <p:txBody>
+          <a:bodyPr/>
+          <a:lstStyle/>
+          <a:p>
+            <a:fld id="{BA466208-0A79-46B9-867D-62F27AABAC82}" type="slidenum">
+              <a:rPr lang="zh-CN" altLang="en-US" smtClean="0"/>
+              <a:t>7</a:t>
+            </a:fld>
+            <a:endParaRPr lang="zh-CN" altLang="en-US"/>
+          </a:p>
+        </p:txBody>
+      </p:sp>
+    </p:spTree>
+    <p:extLst>
+      <p:ext uri="{BB962C8B-B14F-4D97-AF65-F5344CB8AC3E}">
+        <p14:creationId xmlns:p14="http://schemas.microsoft.com/office/powerpoint/2010/main" val="2883434204"/>
+      </p:ext>
+    </p:extLst>
+  </p:cSld>
+  <p:clrMapOvr>
+    <a:masterClrMapping/>
+  </p:clrMapOvr>
+</p:notes>
+</file>
+
 <file path=ppt/slideLayouts/slideLayout1.xml><?xml version="1.0" encoding="utf-8"?>
 <p:sldLayout xmlns:a="http://schemas.openxmlformats.org/drawingml/2006/main" xmlns:r="http://schemas.openxmlformats.org/officeDocument/2006/relationships" xmlns:p="http://schemas.openxmlformats.org/presentationml/2006/main" type="title" preserve="1">
   <p:cSld name="标题幻灯片">
@@ -207,10 +649,10 @@
           </a:lstStyle>
           <a:p>
             <a:r>
-              <a:rPr kumimoji="0" lang="zh-CN" altLang="en-US" smtClean="0"/>
+              <a:rPr kumimoji="0" lang="zh-CN" altLang="en-US" dirty="0" smtClean="0"/>
               <a:t>单击此处编辑母版标题样式</a:t>
             </a:r>
-            <a:endParaRPr kumimoji="0" lang="en-US"/>
+            <a:endParaRPr kumimoji="0" lang="en-US" dirty="0"/>
           </a:p>
         </p:txBody>
       </p:sp>
@@ -268,10 +710,10 @@
           </a:lstStyle>
           <a:p>
             <a:r>
-              <a:rPr kumimoji="0" lang="zh-CN" altLang="en-US" smtClean="0"/>
+              <a:rPr kumimoji="0" lang="zh-CN" altLang="en-US" dirty="0" smtClean="0"/>
               <a:t>单击此处编辑母版副标题样式</a:t>
             </a:r>
-            <a:endParaRPr kumimoji="0" lang="en-US"/>
+            <a:endParaRPr kumimoji="0" lang="en-US" dirty="0"/>
           </a:p>
         </p:txBody>
       </p:sp>
@@ -292,7 +734,7 @@
           <a:p>
             <a:fld id="{20D3601C-F78D-4842-B985-4F222C0B16EB}" type="datetimeFigureOut">
               <a:rPr lang="zh-CN" altLang="en-US" smtClean="0"/>
-              <a:t>2013/4/2</a:t>
+              <a:t>2013/5/28</a:t>
             </a:fld>
             <a:endParaRPr lang="zh-CN" altLang="en-US"/>
           </a:p>
@@ -457,7 +899,7 @@
           <a:p>
             <a:fld id="{20D3601C-F78D-4842-B985-4F222C0B16EB}" type="datetimeFigureOut">
               <a:rPr lang="zh-CN" altLang="en-US" smtClean="0"/>
-              <a:t>2013/4/2</a:t>
+              <a:t>2013/5/28</a:t>
             </a:fld>
             <a:endParaRPr lang="zh-CN" altLang="en-US"/>
           </a:p>
@@ -632,7 +1074,7 @@
           <a:p>
             <a:fld id="{20D3601C-F78D-4842-B985-4F222C0B16EB}" type="datetimeFigureOut">
               <a:rPr lang="zh-CN" altLang="en-US" smtClean="0"/>
-              <a:t>2013/4/2</a:t>
+              <a:t>2013/5/28</a:t>
             </a:fld>
             <a:endParaRPr lang="zh-CN" altLang="en-US"/>
           </a:p>
@@ -745,38 +1187,38 @@
           <a:p>
             <a:pPr lvl="0" eaLnBrk="1" latinLnBrk="0" hangingPunct="1"/>
             <a:r>
-              <a:rPr lang="zh-CN" altLang="en-US" smtClean="0"/>
+              <a:rPr lang="zh-CN" altLang="en-US" dirty="0" smtClean="0"/>
               <a:t>单击此处编辑母版文本样式</a:t>
             </a:r>
           </a:p>
           <a:p>
             <a:pPr lvl="1" eaLnBrk="1" latinLnBrk="0" hangingPunct="1"/>
             <a:r>
-              <a:rPr lang="zh-CN" altLang="en-US" smtClean="0"/>
+              <a:rPr lang="zh-CN" altLang="en-US" dirty="0" smtClean="0"/>
               <a:t>第二级</a:t>
             </a:r>
           </a:p>
           <a:p>
             <a:pPr lvl="2" eaLnBrk="1" latinLnBrk="0" hangingPunct="1"/>
             <a:r>
-              <a:rPr lang="zh-CN" altLang="en-US" smtClean="0"/>
+              <a:rPr lang="zh-CN" altLang="en-US" dirty="0" smtClean="0"/>
               <a:t>第三级</a:t>
             </a:r>
           </a:p>
           <a:p>
             <a:pPr lvl="3" eaLnBrk="1" latinLnBrk="0" hangingPunct="1"/>
             <a:r>
-              <a:rPr lang="zh-CN" altLang="en-US" smtClean="0"/>
+              <a:rPr lang="zh-CN" altLang="en-US" dirty="0" smtClean="0"/>
               <a:t>第四级</a:t>
             </a:r>
           </a:p>
           <a:p>
             <a:pPr lvl="4" eaLnBrk="1" latinLnBrk="0" hangingPunct="1"/>
             <a:r>
-              <a:rPr lang="zh-CN" altLang="en-US" smtClean="0"/>
+              <a:rPr lang="zh-CN" altLang="en-US" dirty="0" smtClean="0"/>
               <a:t>第五级</a:t>
             </a:r>
-            <a:endParaRPr kumimoji="0" lang="en-US"/>
+            <a:endParaRPr kumimoji="0" lang="en-US" dirty="0"/>
           </a:p>
         </p:txBody>
       </p:sp>
@@ -797,7 +1239,7 @@
           <a:p>
             <a:fld id="{20D3601C-F78D-4842-B985-4F222C0B16EB}" type="datetimeFigureOut">
               <a:rPr lang="zh-CN" altLang="en-US" smtClean="0"/>
-              <a:t>2013/4/2</a:t>
+              <a:t>2013/5/28</a:t>
             </a:fld>
             <a:endParaRPr lang="zh-CN" altLang="en-US"/>
           </a:p>
@@ -1016,7 +1458,7 @@
           <a:p>
             <a:pPr lvl="0" eaLnBrk="1" latinLnBrk="0" hangingPunct="1"/>
             <a:r>
-              <a:rPr kumimoji="0" lang="zh-CN" altLang="en-US" smtClean="0"/>
+              <a:rPr kumimoji="0" lang="zh-CN" altLang="en-US" dirty="0" smtClean="0"/>
               <a:t>单击此处编辑母版文本样式</a:t>
             </a:r>
           </a:p>
@@ -1039,7 +1481,7 @@
           <a:p>
             <a:fld id="{20D3601C-F78D-4842-B985-4F222C0B16EB}" type="datetimeFigureOut">
               <a:rPr lang="zh-CN" altLang="en-US" smtClean="0"/>
-              <a:t>2013/4/2</a:t>
+              <a:t>2013/5/28</a:t>
             </a:fld>
             <a:endParaRPr lang="zh-CN" altLang="en-US"/>
           </a:p>
@@ -1303,7 +1745,7 @@
           <a:p>
             <a:fld id="{20D3601C-F78D-4842-B985-4F222C0B16EB}" type="datetimeFigureOut">
               <a:rPr lang="zh-CN" altLang="en-US" smtClean="0"/>
-              <a:t>2013/4/2</a:t>
+              <a:t>2013/5/28</a:t>
             </a:fld>
             <a:endParaRPr lang="zh-CN" altLang="en-US"/>
           </a:p>
@@ -1681,7 +2123,7 @@
           <a:p>
             <a:fld id="{20D3601C-F78D-4842-B985-4F222C0B16EB}" type="datetimeFigureOut">
               <a:rPr lang="zh-CN" altLang="en-US" smtClean="0"/>
-              <a:t>2013/4/2</a:t>
+              <a:t>2013/5/28</a:t>
             </a:fld>
             <a:endParaRPr lang="zh-CN" altLang="en-US"/>
           </a:p>
@@ -1831,7 +2273,7 @@
           <a:p>
             <a:fld id="{20D3601C-F78D-4842-B985-4F222C0B16EB}" type="datetimeFigureOut">
               <a:rPr lang="zh-CN" altLang="en-US" smtClean="0"/>
-              <a:t>2013/4/2</a:t>
+              <a:t>2013/5/28</a:t>
             </a:fld>
             <a:endParaRPr lang="zh-CN" altLang="en-US"/>
           </a:p>
@@ -1921,7 +2363,7 @@
           <a:p>
             <a:fld id="{20D3601C-F78D-4842-B985-4F222C0B16EB}" type="datetimeFigureOut">
               <a:rPr lang="zh-CN" altLang="en-US" smtClean="0"/>
-              <a:t>2013/4/2</a:t>
+              <a:t>2013/5/28</a:t>
             </a:fld>
             <a:endParaRPr lang="zh-CN" altLang="en-US"/>
           </a:p>
@@ -2182,7 +2624,7 @@
           <a:p>
             <a:fld id="{20D3601C-F78D-4842-B985-4F222C0B16EB}" type="datetimeFigureOut">
               <a:rPr lang="zh-CN" altLang="en-US" smtClean="0"/>
-              <a:t>2013/4/2</a:t>
+              <a:t>2013/5/28</a:t>
             </a:fld>
             <a:endParaRPr lang="zh-CN" altLang="en-US"/>
           </a:p>
@@ -2470,7 +2912,7 @@
           <a:p>
             <a:fld id="{20D3601C-F78D-4842-B985-4F222C0B16EB}" type="datetimeFigureOut">
               <a:rPr lang="zh-CN" altLang="en-US" smtClean="0"/>
-              <a:t>2013/4/2</a:t>
+              <a:t>2013/5/28</a:t>
             </a:fld>
             <a:endParaRPr lang="zh-CN" altLang="en-US"/>
           </a:p>
@@ -3171,38 +3613,38 @@
           <a:p>
             <a:pPr lvl="0" eaLnBrk="1" latinLnBrk="0" hangingPunct="1"/>
             <a:r>
-              <a:rPr kumimoji="0" lang="zh-CN" altLang="en-US" smtClean="0"/>
+              <a:rPr kumimoji="0" lang="zh-CN" altLang="en-US" dirty="0" smtClean="0"/>
               <a:t>单击此处编辑母版文本样式</a:t>
             </a:r>
           </a:p>
           <a:p>
             <a:pPr lvl="1" eaLnBrk="1" latinLnBrk="0" hangingPunct="1"/>
             <a:r>
-              <a:rPr kumimoji="0" lang="zh-CN" altLang="en-US" smtClean="0"/>
+              <a:rPr kumimoji="0" lang="zh-CN" altLang="en-US" dirty="0" smtClean="0"/>
               <a:t>第二级</a:t>
             </a:r>
           </a:p>
           <a:p>
             <a:pPr lvl="2" eaLnBrk="1" latinLnBrk="0" hangingPunct="1"/>
             <a:r>
-              <a:rPr kumimoji="0" lang="zh-CN" altLang="en-US" smtClean="0"/>
+              <a:rPr kumimoji="0" lang="zh-CN" altLang="en-US" dirty="0" smtClean="0"/>
               <a:t>第三级</a:t>
             </a:r>
           </a:p>
           <a:p>
             <a:pPr lvl="3" eaLnBrk="1" latinLnBrk="0" hangingPunct="1"/>
             <a:r>
-              <a:rPr kumimoji="0" lang="zh-CN" altLang="en-US" smtClean="0"/>
+              <a:rPr kumimoji="0" lang="zh-CN" altLang="en-US" dirty="0" smtClean="0"/>
               <a:t>第四级</a:t>
             </a:r>
           </a:p>
           <a:p>
             <a:pPr lvl="4" eaLnBrk="1" latinLnBrk="0" hangingPunct="1"/>
             <a:r>
-              <a:rPr kumimoji="0" lang="zh-CN" altLang="en-US" smtClean="0"/>
+              <a:rPr kumimoji="0" lang="zh-CN" altLang="en-US" dirty="0" smtClean="0"/>
               <a:t>第五级</a:t>
             </a:r>
-            <a:endParaRPr kumimoji="0" lang="en-US"/>
+            <a:endParaRPr kumimoji="0" lang="en-US" dirty="0"/>
           </a:p>
         </p:txBody>
       </p:sp>
@@ -3241,7 +3683,7 @@
           <a:p>
             <a:fld id="{20D3601C-F78D-4842-B985-4F222C0B16EB}" type="datetimeFigureOut">
               <a:rPr lang="zh-CN" altLang="en-US" smtClean="0"/>
-              <a:t>2013/4/2</a:t>
+              <a:t>2013/5/28</a:t>
             </a:fld>
             <a:endParaRPr lang="zh-CN" altLang="en-US"/>
           </a:p>
@@ -3591,8 +4033,8 @@
           <a:solidFill>
             <a:schemeClr val="tx1"/>
           </a:solidFill>
-          <a:latin typeface="+mn-lt"/>
-          <a:ea typeface="+mn-ea"/>
+          <a:latin typeface="微软雅黑" pitchFamily="34" charset="-122"/>
+          <a:ea typeface="微软雅黑" pitchFamily="34" charset="-122"/>
           <a:cs typeface="+mn-cs"/>
         </a:defRPr>
       </a:lvl1pPr>
@@ -3610,8 +4052,8 @@
           <a:solidFill>
             <a:schemeClr val="tx1"/>
           </a:solidFill>
-          <a:latin typeface="+mn-lt"/>
-          <a:ea typeface="+mn-ea"/>
+          <a:latin typeface="微软雅黑" pitchFamily="34" charset="-122"/>
+          <a:ea typeface="微软雅黑" pitchFamily="34" charset="-122"/>
           <a:cs typeface="+mn-cs"/>
         </a:defRPr>
       </a:lvl2pPr>
@@ -3629,8 +4071,8 @@
           <a:solidFill>
             <a:schemeClr val="tx1"/>
           </a:solidFill>
-          <a:latin typeface="+mn-lt"/>
-          <a:ea typeface="+mn-ea"/>
+          <a:latin typeface="微软雅黑" pitchFamily="34" charset="-122"/>
+          <a:ea typeface="微软雅黑" pitchFamily="34" charset="-122"/>
           <a:cs typeface="+mn-cs"/>
         </a:defRPr>
       </a:lvl3pPr>
@@ -3648,8 +4090,8 @@
           <a:solidFill>
             <a:schemeClr val="tx1"/>
           </a:solidFill>
-          <a:latin typeface="+mn-lt"/>
-          <a:ea typeface="+mn-ea"/>
+          <a:latin typeface="微软雅黑" pitchFamily="34" charset="-122"/>
+          <a:ea typeface="微软雅黑" pitchFamily="34" charset="-122"/>
           <a:cs typeface="+mn-cs"/>
         </a:defRPr>
       </a:lvl4pPr>
@@ -3667,8 +4109,8 @@
           <a:solidFill>
             <a:schemeClr val="tx1"/>
           </a:solidFill>
-          <a:latin typeface="+mn-lt"/>
-          <a:ea typeface="+mn-ea"/>
+          <a:latin typeface="微软雅黑" pitchFamily="34" charset="-122"/>
+          <a:ea typeface="微软雅黑" pitchFamily="34" charset="-122"/>
           <a:cs typeface="+mn-cs"/>
         </a:defRPr>
       </a:lvl5pPr>
@@ -3875,8 +4317,8 @@
           <a:lstStyle/>
           <a:p>
             <a:r>
-              <a:rPr lang="zh-CN" altLang="en-US" dirty="0"/>
-              <a:t>大</a:t>
+              <a:rPr lang="zh-CN" altLang="en-US" dirty="0" smtClean="0"/>
+              <a:t>软件设计大</a:t>
             </a:r>
             <a:r>
               <a:rPr lang="zh-CN" altLang="en-US" dirty="0" smtClean="0"/>
@@ -3903,7 +4345,11 @@
           <a:p>
             <a:r>
               <a:rPr lang="zh-CN" altLang="en-US" dirty="0" smtClean="0"/>
-              <a:t>郭旭 刘洋 温斌</a:t>
+              <a:t>郭旭 </a:t>
+            </a:r>
+            <a:r>
+              <a:rPr lang="zh-CN" altLang="en-US" dirty="0" smtClean="0"/>
+              <a:t>刘洋 温斌</a:t>
             </a:r>
             <a:endParaRPr lang="zh-CN" altLang="en-US" dirty="0"/>
           </a:p>
@@ -3951,7 +4397,7 @@
           <a:p>
             <a:r>
               <a:rPr lang="zh-CN" altLang="en-US" dirty="0" smtClean="0"/>
-              <a:t>典型设计模式</a:t>
+              <a:t>用户界面层</a:t>
             </a:r>
             <a:endParaRPr lang="zh-CN" altLang="en-US" dirty="0"/>
           </a:p>
@@ -3974,16 +4420,106 @@
           <a:p>
             <a:r>
               <a:rPr lang="en-US" altLang="zh-CN" dirty="0" smtClean="0"/>
-              <a:t>Template</a:t>
-            </a:r>
-          </a:p>
-          <a:p>
-            <a:r>
-              <a:rPr lang="en-US" altLang="zh-CN" dirty="0" smtClean="0"/>
-              <a:t>Factory</a:t>
-            </a:r>
-          </a:p>
-          <a:p>
+              <a:t>Windows</a:t>
+            </a:r>
+          </a:p>
+          <a:p>
+            <a:pPr lvl="1"/>
+            <a:r>
+              <a:rPr lang="en-US" altLang="zh-CN" dirty="0" err="1" smtClean="0"/>
+              <a:t>WinForm</a:t>
+            </a:r>
+            <a:r>
+              <a:rPr lang="en-US" altLang="zh-CN" dirty="0" smtClean="0"/>
+              <a:t> Controls</a:t>
+            </a:r>
+          </a:p>
+          <a:p>
+            <a:pPr lvl="1"/>
+            <a:r>
+              <a:rPr lang="en-US" altLang="zh-CN" dirty="0" smtClean="0"/>
+              <a:t>Component </a:t>
+            </a:r>
+            <a:r>
+              <a:rPr lang="zh-CN" altLang="en-US" dirty="0" smtClean="0"/>
+              <a:t>（</a:t>
+            </a:r>
+            <a:r>
+              <a:rPr lang="en-US" altLang="zh-CN" dirty="0" smtClean="0"/>
+              <a:t>Custom User Controls</a:t>
+            </a:r>
+            <a:r>
+              <a:rPr lang="zh-CN" altLang="en-US" dirty="0" smtClean="0"/>
+              <a:t>）</a:t>
+            </a:r>
+            <a:endParaRPr lang="en-US" altLang="zh-CN" dirty="0" smtClean="0"/>
+          </a:p>
+          <a:p>
+            <a:pPr lvl="2"/>
+            <a:r>
+              <a:rPr lang="en-US" altLang="zh-CN" dirty="0" smtClean="0"/>
+              <a:t>Pictures Control</a:t>
+            </a:r>
+          </a:p>
+          <a:p>
+            <a:pPr lvl="2"/>
+            <a:r>
+              <a:rPr lang="en-US" altLang="zh-CN" dirty="0" err="1" smtClean="0"/>
+              <a:t>Readonly</a:t>
+            </a:r>
+            <a:r>
+              <a:rPr lang="en-US" altLang="zh-CN" dirty="0" smtClean="0"/>
+              <a:t> Pictures Control</a:t>
+            </a:r>
+          </a:p>
+          <a:p>
+            <a:r>
+              <a:rPr lang="en-US" altLang="zh-CN" dirty="0" smtClean="0"/>
+              <a:t>Android</a:t>
+            </a:r>
+          </a:p>
+          <a:p>
+            <a:pPr lvl="1"/>
+            <a:r>
+              <a:rPr lang="zh-CN" altLang="en-US" dirty="0"/>
+              <a:t>使用</a:t>
+            </a:r>
+            <a:r>
+              <a:rPr lang="zh-CN" altLang="en-US" dirty="0" smtClean="0"/>
+              <a:t>了一些最新</a:t>
+            </a:r>
+            <a:r>
+              <a:rPr lang="zh-CN" altLang="en-US" dirty="0"/>
+              <a:t>的</a:t>
+            </a:r>
+            <a:r>
+              <a:rPr lang="zh-CN" altLang="en-US" dirty="0" smtClean="0"/>
+              <a:t>（</a:t>
+            </a:r>
+            <a:r>
+              <a:rPr lang="en-US" altLang="zh-CN" dirty="0" smtClean="0"/>
+              <a:t>Android3.0</a:t>
+            </a:r>
+            <a:r>
+              <a:rPr lang="zh-CN" altLang="en-US" dirty="0" smtClean="0"/>
+              <a:t>、</a:t>
+            </a:r>
+            <a:r>
+              <a:rPr lang="en-US" altLang="zh-CN" dirty="0" smtClean="0"/>
+              <a:t>4.0</a:t>
+            </a:r>
+            <a:r>
+              <a:rPr lang="zh-CN" altLang="en-US" dirty="0" smtClean="0"/>
+              <a:t>）</a:t>
+            </a:r>
+            <a:r>
+              <a:rPr lang="en-US" altLang="zh-CN" dirty="0" smtClean="0"/>
+              <a:t>UI</a:t>
+            </a:r>
+            <a:r>
+              <a:rPr lang="zh-CN" altLang="en-US" dirty="0" smtClean="0"/>
+              <a:t>设计方案</a:t>
+            </a:r>
             <a:endParaRPr lang="zh-CN" altLang="en-US" dirty="0"/>
           </a:p>
         </p:txBody>
@@ -4029,8 +4565,8 @@
           <a:lstStyle/>
           <a:p>
             <a:r>
-              <a:rPr lang="zh-CN" altLang="en-US" dirty="0" smtClean="0"/>
-              <a:t>心得体会</a:t>
+              <a:rPr lang="en-US" altLang="zh-CN" dirty="0" smtClean="0"/>
+              <a:t>AOP</a:t>
             </a:r>
             <a:endParaRPr lang="zh-CN" altLang="en-US" dirty="0"/>
           </a:p>
@@ -4052,27 +4588,47 @@
           <a:lstStyle/>
           <a:p>
             <a:r>
+              <a:rPr lang="en-US" altLang="zh-CN" dirty="0" smtClean="0"/>
+              <a:t>Spring.NET VS </a:t>
+            </a:r>
+            <a:r>
               <a:rPr lang="en-US" altLang="zh-CN" dirty="0" err="1" smtClean="0"/>
-              <a:t>GitHub</a:t>
+              <a:t>PostSharp</a:t>
             </a:r>
             <a:endParaRPr lang="en-US" altLang="zh-CN" dirty="0" smtClean="0"/>
           </a:p>
           <a:p>
             <a:pPr lvl="1"/>
             <a:r>
-              <a:rPr lang="en-US" altLang="zh-CN" dirty="0" smtClean="0"/>
-              <a:t>http://github.com/ggxx/SextantTG/</a:t>
-            </a:r>
-          </a:p>
-          <a:p>
-            <a:r>
-              <a:rPr lang="en-US" altLang="zh-CN" dirty="0" smtClean="0"/>
-              <a:t>Tools</a:t>
-            </a:r>
+              <a:rPr lang="zh-CN" altLang="en-US" dirty="0"/>
+              <a:t>两者</a:t>
+            </a:r>
+            <a:r>
+              <a:rPr lang="zh-CN" altLang="en-US" dirty="0" smtClean="0"/>
+              <a:t>比较</a:t>
+            </a:r>
+            <a:endParaRPr lang="en-US" altLang="zh-CN" dirty="0" smtClean="0"/>
+          </a:p>
+          <a:p>
+            <a:pPr lvl="1"/>
+            <a:r>
+              <a:rPr lang="zh-CN" altLang="en-US" dirty="0" smtClean="0"/>
+              <a:t>最终选择了</a:t>
+            </a:r>
+            <a:r>
+              <a:rPr lang="en-US" altLang="zh-CN" dirty="0" err="1" smtClean="0"/>
+              <a:t>PostSharp</a:t>
+            </a:r>
+            <a:endParaRPr lang="zh-CN" altLang="en-US" dirty="0"/>
           </a:p>
         </p:txBody>
       </p:sp>
     </p:spTree>
+    <p:extLst>
+      <p:ext uri="{BB962C8B-B14F-4D97-AF65-F5344CB8AC3E}">
+        <p14:creationId xmlns:p14="http://schemas.microsoft.com/office/powerpoint/2010/main" val="3774537895"/>
+      </p:ext>
+    </p:extLst>
   </p:cSld>
   <p:clrMapOvr>
     <a:masterClrMapping/>
@@ -4113,8 +4669,8 @@
           <a:lstStyle/>
           <a:p>
             <a:r>
-              <a:rPr lang="zh-CN" altLang="en-US" dirty="0" smtClean="0"/>
-              <a:t>演示</a:t>
+              <a:rPr lang="en-US" altLang="zh-CN" dirty="0" smtClean="0"/>
+              <a:t>Log</a:t>
             </a:r>
             <a:endParaRPr lang="zh-CN" altLang="en-US" dirty="0"/>
           </a:p>
@@ -4135,15 +4691,51 @@
           <a:bodyPr/>
           <a:lstStyle/>
           <a:p>
-            <a:endParaRPr lang="zh-CN" altLang="en-US"/>
+            <a:r>
+              <a:rPr lang="en-US" altLang="zh-CN" dirty="0" smtClean="0"/>
+              <a:t>Log4Net VS </a:t>
+            </a:r>
+            <a:r>
+              <a:rPr lang="en-US" altLang="zh-CN" dirty="0" err="1" smtClean="0"/>
+              <a:t>NLog</a:t>
+            </a:r>
+            <a:endParaRPr lang="en-US" altLang="zh-CN" dirty="0" smtClean="0"/>
+          </a:p>
+          <a:p>
+            <a:pPr lvl="1"/>
+            <a:r>
+              <a:rPr lang="zh-CN" altLang="en-US" dirty="0" smtClean="0"/>
+              <a:t>两者比较</a:t>
+            </a:r>
+            <a:endParaRPr lang="en-US" altLang="zh-CN" dirty="0" smtClean="0"/>
+          </a:p>
+          <a:p>
+            <a:pPr lvl="1"/>
+            <a:r>
+              <a:rPr lang="zh-CN" altLang="en-US" dirty="0" smtClean="0"/>
+              <a:t>两者都支持</a:t>
+            </a:r>
+            <a:endParaRPr lang="zh-CN" altLang="en-US" dirty="0"/>
           </a:p>
         </p:txBody>
       </p:sp>
     </p:spTree>
+    <p:extLst>
+      <p:ext uri="{BB962C8B-B14F-4D97-AF65-F5344CB8AC3E}">
+        <p14:creationId xmlns:p14="http://schemas.microsoft.com/office/powerpoint/2010/main" val="4213798011"/>
+      </p:ext>
+    </p:extLst>
   </p:cSld>
   <p:clrMapOvr>
     <a:masterClrMapping/>
   </p:clrMapOvr>
+  <p:timing>
+    <p:tnLst>
+      <p:par>
+        <p:cTn id="1" dur="indefinite" restart="never" nodeType="tmRoot"/>
+      </p:par>
+    </p:tnLst>
+  </p:timing>
 </p:sld>
 </file>
 
@@ -4180,8 +4772,1358 @@
           <a:lstStyle/>
           <a:p>
             <a:r>
-              <a:rPr lang="zh-CN" altLang="en-US" dirty="0" smtClean="0"/>
-              <a:t>参考文献</a:t>
+              <a:rPr lang="en-US" altLang="zh-CN" dirty="0" smtClean="0"/>
+              <a:t>Web Service</a:t>
+            </a:r>
+            <a:endParaRPr lang="zh-CN" altLang="en-US" dirty="0"/>
+          </a:p>
+        </p:txBody>
+      </p:sp>
+      <p:sp>
+        <p:nvSpPr>
+          <p:cNvPr id="3" name="内容占位符 2"/>
+          <p:cNvSpPr>
+            <a:spLocks noGrp="1"/>
+          </p:cNvSpPr>
+          <p:nvPr>
+            <p:ph idx="1"/>
+          </p:nvPr>
+        </p:nvSpPr>
+        <p:spPr/>
+        <p:txBody>
+          <a:bodyPr/>
+          <a:lstStyle/>
+          <a:p>
+            <a:r>
+              <a:rPr lang="zh-CN" altLang="en-US" dirty="0" smtClean="0"/>
+              <a:t>在</a:t>
+            </a:r>
+            <a:r>
+              <a:rPr lang="en-US" altLang="zh-CN" dirty="0" smtClean="0"/>
+              <a:t>Service</a:t>
+            </a:r>
+            <a:r>
+              <a:rPr lang="zh-CN" altLang="en-US" dirty="0" smtClean="0"/>
+              <a:t>基础上封装</a:t>
+            </a:r>
+            <a:r>
+              <a:rPr lang="zh-CN" altLang="en-US" dirty="0"/>
+              <a:t>，</a:t>
+            </a:r>
+            <a:r>
+              <a:rPr lang="zh-CN" altLang="en-US" dirty="0" smtClean="0"/>
+              <a:t>定义</a:t>
+            </a:r>
+            <a:r>
+              <a:rPr lang="en-US" altLang="zh-CN" dirty="0" smtClean="0"/>
+              <a:t>XML</a:t>
+            </a:r>
+            <a:r>
+              <a:rPr lang="zh-CN" altLang="en-US" dirty="0" smtClean="0"/>
+              <a:t>格式</a:t>
+            </a:r>
+            <a:endParaRPr lang="en-US" altLang="zh-CN" dirty="0" smtClean="0"/>
+          </a:p>
+        </p:txBody>
+      </p:sp>
+      <p:sp>
+        <p:nvSpPr>
+          <p:cNvPr id="4" name="TextBox 3"/>
+          <p:cNvSpPr txBox="1"/>
+          <p:nvPr/>
+        </p:nvSpPr>
+        <p:spPr>
+          <a:xfrm>
+            <a:off x="827584" y="2420888"/>
+            <a:ext cx="5976664" cy="2585323"/>
+          </a:xfrm>
+          <a:prstGeom prst="rect">
+            <a:avLst/>
+          </a:prstGeom>
+        </p:spPr>
+        <p:style>
+          <a:lnRef idx="3">
+            <a:schemeClr val="lt1"/>
+          </a:lnRef>
+          <a:fillRef idx="1">
+            <a:schemeClr val="accent1"/>
+          </a:fillRef>
+          <a:effectRef idx="1">
+            <a:schemeClr val="accent1"/>
+          </a:effectRef>
+          <a:fontRef idx="minor">
+            <a:schemeClr val="lt1"/>
+          </a:fontRef>
+        </p:style>
+        <p:txBody>
+          <a:bodyPr wrap="square" rtlCol="0">
+            <a:spAutoFit/>
+          </a:bodyPr>
+          <a:lstStyle/>
+          <a:p>
+            <a:r>
+              <a:rPr lang="en-US" altLang="zh-CN" dirty="0"/>
+              <a:t>&lt;?xml version="1.0" encoding="utf-8"?&gt;</a:t>
+            </a:r>
+          </a:p>
+          <a:p>
+            <a:r>
+              <a:rPr lang="en-US" altLang="zh-CN" dirty="0" smtClean="0"/>
+              <a:t>&lt;Request </a:t>
+            </a:r>
+            <a:r>
+              <a:rPr lang="en-US" altLang="zh-CN" dirty="0" err="1"/>
+              <a:t>xmlns</a:t>
+            </a:r>
+            <a:r>
+              <a:rPr lang="en-US" altLang="zh-CN" dirty="0"/>
+              <a:t>="http://github.com/</a:t>
+            </a:r>
+            <a:r>
+              <a:rPr lang="en-US" altLang="zh-CN" dirty="0" err="1"/>
+              <a:t>ggxx</a:t>
+            </a:r>
+            <a:r>
+              <a:rPr lang="en-US" altLang="zh-CN" dirty="0"/>
+              <a:t>/</a:t>
+            </a:r>
+            <a:r>
+              <a:rPr lang="en-US" altLang="zh-CN" dirty="0" err="1"/>
+              <a:t>SextantTG</a:t>
+            </a:r>
+            <a:r>
+              <a:rPr lang="en-US" altLang="zh-CN" dirty="0"/>
+              <a:t>/"&gt;</a:t>
+            </a:r>
+          </a:p>
+          <a:p>
+            <a:r>
+              <a:rPr lang="en-US" altLang="zh-CN" dirty="0" smtClean="0"/>
+              <a:t>  &lt;</a:t>
+            </a:r>
+            <a:r>
+              <a:rPr lang="en-US" altLang="zh-CN" dirty="0" err="1"/>
+              <a:t>UserObject</a:t>
+            </a:r>
+            <a:r>
+              <a:rPr lang="en-US" altLang="zh-CN" dirty="0" smtClean="0"/>
+              <a:t>&gt;</a:t>
+            </a:r>
+          </a:p>
+          <a:p>
+            <a:r>
+              <a:rPr lang="en-US" altLang="zh-CN" dirty="0" smtClean="0"/>
+              <a:t>    &lt;</a:t>
+            </a:r>
+            <a:r>
+              <a:rPr lang="en-US" altLang="zh-CN" dirty="0" err="1" smtClean="0"/>
+              <a:t>UserId</a:t>
+            </a:r>
+            <a:r>
+              <a:rPr lang="en-US" altLang="zh-CN" dirty="0" smtClean="0"/>
+              <a:t>&gt;00001&lt;/</a:t>
+            </a:r>
+            <a:r>
+              <a:rPr lang="en-US" altLang="zh-CN" dirty="0" err="1"/>
+              <a:t>UserId</a:t>
+            </a:r>
+            <a:r>
+              <a:rPr lang="en-US" altLang="zh-CN" dirty="0" smtClean="0"/>
+              <a:t>&gt;</a:t>
+            </a:r>
+          </a:p>
+          <a:p>
+            <a:r>
+              <a:rPr lang="en-US" altLang="zh-CN" dirty="0" smtClean="0"/>
+              <a:t>    &lt;</a:t>
+            </a:r>
+            <a:r>
+              <a:rPr lang="en-US" altLang="zh-CN" dirty="0" err="1" smtClean="0"/>
+              <a:t>LoginName</a:t>
+            </a:r>
+            <a:r>
+              <a:rPr lang="en-US" altLang="zh-CN" dirty="0" smtClean="0"/>
+              <a:t>&gt;Admin&lt;/</a:t>
+            </a:r>
+            <a:r>
+              <a:rPr lang="en-US" altLang="zh-CN" dirty="0" err="1"/>
+              <a:t>LoginName</a:t>
+            </a:r>
+            <a:r>
+              <a:rPr lang="en-US" altLang="zh-CN" dirty="0" smtClean="0"/>
+              <a:t>&gt;</a:t>
+            </a:r>
+          </a:p>
+          <a:p>
+            <a:r>
+              <a:rPr lang="en-US" altLang="zh-CN" dirty="0" smtClean="0"/>
+              <a:t>    &lt;Email&gt;admin@sina.com&lt;/</a:t>
+            </a:r>
+            <a:r>
+              <a:rPr lang="en-US" altLang="zh-CN" dirty="0"/>
+              <a:t>Email</a:t>
+            </a:r>
+            <a:r>
+              <a:rPr lang="en-US" altLang="zh-CN" dirty="0" smtClean="0"/>
+              <a:t>&gt;</a:t>
+            </a:r>
+          </a:p>
+          <a:p>
+            <a:r>
+              <a:rPr lang="en-US" altLang="zh-CN" dirty="0" smtClean="0"/>
+              <a:t>    &lt;Status&gt;0&lt;/</a:t>
+            </a:r>
+            <a:r>
+              <a:rPr lang="en-US" altLang="zh-CN" dirty="0"/>
+              <a:t>Status</a:t>
+            </a:r>
+            <a:r>
+              <a:rPr lang="en-US" altLang="zh-CN" dirty="0" smtClean="0"/>
+              <a:t>&gt;</a:t>
+            </a:r>
+          </a:p>
+          <a:p>
+            <a:r>
+              <a:rPr lang="en-US" altLang="zh-CN" dirty="0" smtClean="0"/>
+              <a:t>  &lt;/</a:t>
+            </a:r>
+            <a:r>
+              <a:rPr lang="en-US" altLang="zh-CN" dirty="0" err="1"/>
+              <a:t>UserObject</a:t>
+            </a:r>
+            <a:r>
+              <a:rPr lang="en-US" altLang="zh-CN" dirty="0" smtClean="0"/>
+              <a:t>&gt;</a:t>
+            </a:r>
+          </a:p>
+          <a:p>
+            <a:r>
+              <a:rPr lang="en-US" altLang="zh-CN" dirty="0" smtClean="0"/>
+              <a:t>&lt;/</a:t>
+            </a:r>
+            <a:r>
+              <a:rPr lang="en-US" altLang="zh-CN" dirty="0"/>
+              <a:t>Request</a:t>
+            </a:r>
+            <a:r>
+              <a:rPr lang="en-US" altLang="zh-CN" dirty="0" smtClean="0"/>
+              <a:t>&gt;</a:t>
+            </a:r>
+            <a:endParaRPr lang="zh-CN" altLang="en-US" dirty="0"/>
+          </a:p>
+        </p:txBody>
+      </p:sp>
+      <p:sp>
+        <p:nvSpPr>
+          <p:cNvPr id="5" name="TextBox 4"/>
+          <p:cNvSpPr txBox="1"/>
+          <p:nvPr/>
+        </p:nvSpPr>
+        <p:spPr>
+          <a:xfrm>
+            <a:off x="2267744" y="5085184"/>
+            <a:ext cx="5976664" cy="1477328"/>
+          </a:xfrm>
+          <a:prstGeom prst="rect">
+            <a:avLst/>
+          </a:prstGeom>
+        </p:spPr>
+        <p:style>
+          <a:lnRef idx="3">
+            <a:schemeClr val="lt1"/>
+          </a:lnRef>
+          <a:fillRef idx="1">
+            <a:schemeClr val="accent1"/>
+          </a:fillRef>
+          <a:effectRef idx="1">
+            <a:schemeClr val="accent1"/>
+          </a:effectRef>
+          <a:fontRef idx="minor">
+            <a:schemeClr val="lt1"/>
+          </a:fontRef>
+        </p:style>
+        <p:txBody>
+          <a:bodyPr wrap="square" rtlCol="0">
+            <a:spAutoFit/>
+          </a:bodyPr>
+          <a:lstStyle/>
+          <a:p>
+            <a:r>
+              <a:rPr lang="en-US" altLang="zh-CN" dirty="0"/>
+              <a:t>&lt;?xml version="1.0" encoding="utf-8"?&gt;</a:t>
+            </a:r>
+          </a:p>
+          <a:p>
+            <a:r>
+              <a:rPr lang="en-US" altLang="zh-CN" dirty="0"/>
+              <a:t>&lt;Response </a:t>
+            </a:r>
+            <a:r>
+              <a:rPr lang="en-US" altLang="zh-CN" dirty="0" err="1"/>
+              <a:t>xmlns</a:t>
+            </a:r>
+            <a:r>
+              <a:rPr lang="en-US" altLang="zh-CN" dirty="0"/>
+              <a:t>="http://github.com/</a:t>
+            </a:r>
+            <a:r>
+              <a:rPr lang="en-US" altLang="zh-CN" dirty="0" err="1"/>
+              <a:t>ggxx</a:t>
+            </a:r>
+            <a:r>
+              <a:rPr lang="en-US" altLang="zh-CN" dirty="0"/>
+              <a:t>/</a:t>
+            </a:r>
+            <a:r>
+              <a:rPr lang="en-US" altLang="zh-CN" dirty="0" err="1"/>
+              <a:t>SextantTG</a:t>
+            </a:r>
+            <a:r>
+              <a:rPr lang="en-US" altLang="zh-CN" dirty="0"/>
+              <a:t>/"&gt;</a:t>
+            </a:r>
+          </a:p>
+          <a:p>
+            <a:r>
+              <a:rPr lang="en-US" altLang="zh-CN" dirty="0" smtClean="0"/>
+              <a:t>  &lt;Message&gt;Error Message&lt;/Message&gt;</a:t>
+            </a:r>
+          </a:p>
+          <a:p>
+            <a:r>
+              <a:rPr lang="en-US" altLang="zh-CN" dirty="0"/>
+              <a:t> </a:t>
+            </a:r>
+            <a:r>
+              <a:rPr lang="en-US" altLang="zh-CN" dirty="0" smtClean="0"/>
+              <a:t> &lt;Result&gt;&lt;/Result&gt;</a:t>
+            </a:r>
+          </a:p>
+          <a:p>
+            <a:r>
+              <a:rPr lang="en-US" altLang="zh-CN" dirty="0" smtClean="0"/>
+              <a:t>&lt;/Response&gt;</a:t>
+            </a:r>
+            <a:endParaRPr lang="zh-CN" altLang="en-US" dirty="0"/>
+          </a:p>
+        </p:txBody>
+      </p:sp>
+    </p:spTree>
+    <p:extLst>
+      <p:ext uri="{BB962C8B-B14F-4D97-AF65-F5344CB8AC3E}">
+        <p14:creationId xmlns:p14="http://schemas.microsoft.com/office/powerpoint/2010/main" val="4065926170"/>
+      </p:ext>
+    </p:extLst>
+  </p:cSld>
+  <p:clrMapOvr>
+    <a:masterClrMapping/>
+  </p:clrMapOvr>
+  <p:timing>
+    <p:tnLst>
+      <p:par>
+        <p:cTn id="1" dur="indefinite" restart="never" nodeType="tmRoot"/>
+      </p:par>
+    </p:tnLst>
+  </p:timing>
+</p:sld>
+</file>
+
+<file path=ppt/slides/slide14.xml><?xml version="1.0" encoding="utf-8"?>
+<p:sld xmlns:a="http://schemas.openxmlformats.org/drawingml/2006/main" xmlns:r="http://schemas.openxmlformats.org/officeDocument/2006/relationships" xmlns:p="http://schemas.openxmlformats.org/presentationml/2006/main">
+  <p:cSld>
+    <p:spTree>
+      <p:nvGrpSpPr>
+        <p:cNvPr id="1" name=""/>
+        <p:cNvGrpSpPr/>
+        <p:nvPr/>
+      </p:nvGrpSpPr>
+      <p:grpSpPr>
+        <a:xfrm>
+          <a:off x="0" y="0"/>
+          <a:ext cx="0" cy="0"/>
+          <a:chOff x="0" y="0"/>
+          <a:chExt cx="0" cy="0"/>
+        </a:xfrm>
+      </p:grpSpPr>
+      <p:sp>
+        <p:nvSpPr>
+          <p:cNvPr id="2" name="标题 1"/>
+          <p:cNvSpPr>
+            <a:spLocks noGrp="1"/>
+          </p:cNvSpPr>
+          <p:nvPr>
+            <p:ph type="title"/>
+          </p:nvPr>
+        </p:nvSpPr>
+        <p:spPr/>
+        <p:txBody>
+          <a:bodyPr/>
+          <a:lstStyle/>
+          <a:p>
+            <a:endParaRPr lang="zh-CN" altLang="en-US" dirty="0"/>
+          </a:p>
+        </p:txBody>
+      </p:sp>
+      <p:sp>
+        <p:nvSpPr>
+          <p:cNvPr id="3" name="内容占位符 2"/>
+          <p:cNvSpPr>
+            <a:spLocks noGrp="1"/>
+          </p:cNvSpPr>
+          <p:nvPr>
+            <p:ph idx="1"/>
+          </p:nvPr>
+        </p:nvSpPr>
+        <p:spPr/>
+        <p:txBody>
+          <a:bodyPr/>
+          <a:lstStyle/>
+          <a:p>
+            <a:endParaRPr lang="zh-CN" altLang="en-US"/>
+          </a:p>
+        </p:txBody>
+      </p:sp>
+      <p:sp>
+        <p:nvSpPr>
+          <p:cNvPr id="4" name="TextBox 3"/>
+          <p:cNvSpPr txBox="1"/>
+          <p:nvPr/>
+        </p:nvSpPr>
+        <p:spPr>
+          <a:xfrm>
+            <a:off x="467544" y="523701"/>
+            <a:ext cx="8208911" cy="6001643"/>
+          </a:xfrm>
+          <a:prstGeom prst="rect">
+            <a:avLst/>
+          </a:prstGeom>
+        </p:spPr>
+        <p:style>
+          <a:lnRef idx="3">
+            <a:schemeClr val="lt1"/>
+          </a:lnRef>
+          <a:fillRef idx="1">
+            <a:schemeClr val="accent1"/>
+          </a:fillRef>
+          <a:effectRef idx="1">
+            <a:schemeClr val="accent1"/>
+          </a:effectRef>
+          <a:fontRef idx="minor">
+            <a:schemeClr val="lt1"/>
+          </a:fontRef>
+        </p:style>
+        <p:txBody>
+          <a:bodyPr wrap="square" rtlCol="0">
+            <a:spAutoFit/>
+          </a:bodyPr>
+          <a:lstStyle/>
+          <a:p>
+            <a:r>
+              <a:rPr lang="en-US" altLang="zh-CN" sz="1600" dirty="0"/>
+              <a:t>&lt;?xml version="1.0" encoding="utf-8"?&gt;</a:t>
+            </a:r>
+          </a:p>
+          <a:p>
+            <a:r>
+              <a:rPr lang="en-US" altLang="zh-CN" sz="1600" dirty="0"/>
+              <a:t>&lt;Response </a:t>
+            </a:r>
+            <a:r>
+              <a:rPr lang="en-US" altLang="zh-CN" sz="1600" dirty="0" err="1"/>
+              <a:t>xmlns</a:t>
+            </a:r>
+            <a:r>
+              <a:rPr lang="en-US" altLang="zh-CN" sz="1600" dirty="0"/>
+              <a:t>="http://github.com/</a:t>
+            </a:r>
+            <a:r>
+              <a:rPr lang="en-US" altLang="zh-CN" sz="1600" dirty="0" err="1"/>
+              <a:t>ggxx</a:t>
+            </a:r>
+            <a:r>
+              <a:rPr lang="en-US" altLang="zh-CN" sz="1600" dirty="0"/>
+              <a:t>/</a:t>
+            </a:r>
+            <a:r>
+              <a:rPr lang="en-US" altLang="zh-CN" sz="1600" dirty="0" err="1"/>
+              <a:t>SextantTG</a:t>
+            </a:r>
+            <a:r>
+              <a:rPr lang="en-US" altLang="zh-CN" sz="1600" dirty="0"/>
+              <a:t>/"&gt;</a:t>
+            </a:r>
+          </a:p>
+          <a:p>
+            <a:r>
+              <a:rPr lang="en-US" altLang="zh-CN" sz="1600" dirty="0"/>
+              <a:t>  &lt;Message</a:t>
+            </a:r>
+            <a:r>
+              <a:rPr lang="en-US" altLang="zh-CN" sz="1600" dirty="0" smtClean="0"/>
+              <a:t>&gt;&lt;/</a:t>
+            </a:r>
+            <a:r>
+              <a:rPr lang="en-US" altLang="zh-CN" sz="1600" dirty="0"/>
+              <a:t>Message&gt;</a:t>
+            </a:r>
+          </a:p>
+          <a:p>
+            <a:r>
+              <a:rPr lang="en-US" altLang="zh-CN" sz="1600" dirty="0"/>
+              <a:t>  &lt;Result&gt;</a:t>
+            </a:r>
+          </a:p>
+          <a:p>
+            <a:r>
+              <a:rPr lang="en-US" altLang="zh-CN" sz="1600" dirty="0"/>
+              <a:t>    &lt;</a:t>
+            </a:r>
+            <a:r>
+              <a:rPr lang="en-US" altLang="zh-CN" sz="1600" dirty="0" err="1"/>
+              <a:t>CountryItemList</a:t>
+            </a:r>
+            <a:r>
+              <a:rPr lang="en-US" altLang="zh-CN" sz="1600" dirty="0"/>
+              <a:t>&gt;</a:t>
+            </a:r>
+          </a:p>
+          <a:p>
+            <a:r>
+              <a:rPr lang="en-US" altLang="zh-CN" sz="1600" dirty="0"/>
+              <a:t>      &lt;</a:t>
+            </a:r>
+            <a:r>
+              <a:rPr lang="en-US" altLang="zh-CN" sz="1600" dirty="0" err="1"/>
+              <a:t>CountryItem</a:t>
+            </a:r>
+            <a:r>
+              <a:rPr lang="en-US" altLang="zh-CN" sz="1600" dirty="0"/>
+              <a:t>&gt;</a:t>
+            </a:r>
+          </a:p>
+          <a:p>
+            <a:r>
+              <a:rPr lang="en-US" altLang="zh-CN" sz="1600" dirty="0"/>
+              <a:t>        &lt;</a:t>
+            </a:r>
+            <a:r>
+              <a:rPr lang="en-US" altLang="zh-CN" sz="1600" dirty="0" err="1"/>
+              <a:t>CountryId</a:t>
+            </a:r>
+            <a:r>
+              <a:rPr lang="en-US" altLang="zh-CN" sz="1600" dirty="0"/>
+              <a:t>&gt;001&lt;/</a:t>
+            </a:r>
+            <a:r>
+              <a:rPr lang="en-US" altLang="zh-CN" sz="1600" dirty="0" err="1"/>
+              <a:t>CountryId</a:t>
+            </a:r>
+            <a:r>
+              <a:rPr lang="en-US" altLang="zh-CN" sz="1600" dirty="0"/>
+              <a:t>&gt;</a:t>
+            </a:r>
+          </a:p>
+          <a:p>
+            <a:r>
+              <a:rPr lang="en-US" altLang="zh-CN" sz="1600" dirty="0"/>
+              <a:t>        &lt;</a:t>
+            </a:r>
+            <a:r>
+              <a:rPr lang="en-US" altLang="zh-CN" sz="1600" dirty="0" err="1"/>
+              <a:t>CountryName</a:t>
+            </a:r>
+            <a:r>
+              <a:rPr lang="en-US" altLang="zh-CN" sz="1600" dirty="0"/>
+              <a:t>&gt;</a:t>
+            </a:r>
+            <a:r>
+              <a:rPr lang="zh-CN" altLang="en-US" sz="1600" dirty="0"/>
+              <a:t>中国</a:t>
+            </a:r>
+            <a:r>
+              <a:rPr lang="en-US" altLang="zh-CN" sz="1600" dirty="0"/>
+              <a:t>&lt;/</a:t>
+            </a:r>
+            <a:r>
+              <a:rPr lang="en-US" altLang="zh-CN" sz="1600" dirty="0" err="1"/>
+              <a:t>CountryName</a:t>
+            </a:r>
+            <a:r>
+              <a:rPr lang="en-US" altLang="zh-CN" sz="1600" dirty="0"/>
+              <a:t>&gt;</a:t>
+            </a:r>
+          </a:p>
+          <a:p>
+            <a:r>
+              <a:rPr lang="en-US" altLang="zh-CN" sz="1600" dirty="0"/>
+              <a:t>      &lt;/</a:t>
+            </a:r>
+            <a:r>
+              <a:rPr lang="en-US" altLang="zh-CN" sz="1600" dirty="0" err="1"/>
+              <a:t>CountryItem</a:t>
+            </a:r>
+            <a:r>
+              <a:rPr lang="en-US" altLang="zh-CN" sz="1600" dirty="0"/>
+              <a:t>&gt;</a:t>
+            </a:r>
+          </a:p>
+          <a:p>
+            <a:r>
+              <a:rPr lang="en-US" altLang="zh-CN" sz="1600" dirty="0"/>
+              <a:t>      &lt;</a:t>
+            </a:r>
+            <a:r>
+              <a:rPr lang="en-US" altLang="zh-CN" sz="1600" dirty="0" err="1"/>
+              <a:t>CountryItem</a:t>
+            </a:r>
+            <a:r>
+              <a:rPr lang="en-US" altLang="zh-CN" sz="1600" dirty="0"/>
+              <a:t>&gt;</a:t>
+            </a:r>
+          </a:p>
+          <a:p>
+            <a:r>
+              <a:rPr lang="en-US" altLang="zh-CN" sz="1600" dirty="0"/>
+              <a:t>        &lt;</a:t>
+            </a:r>
+            <a:r>
+              <a:rPr lang="en-US" altLang="zh-CN" sz="1600" dirty="0" err="1"/>
+              <a:t>CountryId</a:t>
+            </a:r>
+            <a:r>
+              <a:rPr lang="en-US" altLang="zh-CN" sz="1600" dirty="0"/>
+              <a:t>&gt;1FA5008987704109B46105E2BD4C5269&lt;/</a:t>
+            </a:r>
+            <a:r>
+              <a:rPr lang="en-US" altLang="zh-CN" sz="1600" dirty="0" err="1"/>
+              <a:t>CountryId</a:t>
+            </a:r>
+            <a:r>
+              <a:rPr lang="en-US" altLang="zh-CN" sz="1600" dirty="0"/>
+              <a:t>&gt;</a:t>
+            </a:r>
+          </a:p>
+          <a:p>
+            <a:r>
+              <a:rPr lang="en-US" altLang="zh-CN" sz="1600" dirty="0"/>
+              <a:t>        &lt;</a:t>
+            </a:r>
+            <a:r>
+              <a:rPr lang="en-US" altLang="zh-CN" sz="1600" dirty="0" err="1"/>
+              <a:t>CountryName</a:t>
+            </a:r>
+            <a:r>
+              <a:rPr lang="en-US" altLang="zh-CN" sz="1600" dirty="0"/>
+              <a:t>&gt;</a:t>
+            </a:r>
+            <a:r>
+              <a:rPr lang="zh-CN" altLang="en-US" sz="1600" dirty="0"/>
+              <a:t>英国</a:t>
+            </a:r>
+            <a:r>
+              <a:rPr lang="en-US" altLang="zh-CN" sz="1600" dirty="0"/>
+              <a:t>&lt;/</a:t>
+            </a:r>
+            <a:r>
+              <a:rPr lang="en-US" altLang="zh-CN" sz="1600" dirty="0" err="1"/>
+              <a:t>CountryName</a:t>
+            </a:r>
+            <a:r>
+              <a:rPr lang="en-US" altLang="zh-CN" sz="1600" dirty="0"/>
+              <a:t>&gt;</a:t>
+            </a:r>
+          </a:p>
+          <a:p>
+            <a:r>
+              <a:rPr lang="en-US" altLang="zh-CN" sz="1600" dirty="0"/>
+              <a:t>      &lt;/</a:t>
+            </a:r>
+            <a:r>
+              <a:rPr lang="en-US" altLang="zh-CN" sz="1600" dirty="0" err="1"/>
+              <a:t>CountryItem</a:t>
+            </a:r>
+            <a:r>
+              <a:rPr lang="en-US" altLang="zh-CN" sz="1600" dirty="0"/>
+              <a:t>&gt;</a:t>
+            </a:r>
+          </a:p>
+          <a:p>
+            <a:r>
+              <a:rPr lang="en-US" altLang="zh-CN" sz="1600" dirty="0"/>
+              <a:t>      &lt;</a:t>
+            </a:r>
+            <a:r>
+              <a:rPr lang="en-US" altLang="zh-CN" sz="1600" dirty="0" err="1"/>
+              <a:t>CountryItem</a:t>
+            </a:r>
+            <a:r>
+              <a:rPr lang="en-US" altLang="zh-CN" sz="1600" dirty="0"/>
+              <a:t>&gt;</a:t>
+            </a:r>
+          </a:p>
+          <a:p>
+            <a:r>
+              <a:rPr lang="en-US" altLang="zh-CN" sz="1600" dirty="0"/>
+              <a:t>        &lt;</a:t>
+            </a:r>
+            <a:r>
+              <a:rPr lang="en-US" altLang="zh-CN" sz="1600" dirty="0" err="1"/>
+              <a:t>CountryId</a:t>
+            </a:r>
+            <a:r>
+              <a:rPr lang="en-US" altLang="zh-CN" sz="1600" dirty="0"/>
+              <a:t>&gt;67114F206B9E4DBB9822C19CFC3A903C&lt;/</a:t>
+            </a:r>
+            <a:r>
+              <a:rPr lang="en-US" altLang="zh-CN" sz="1600" dirty="0" err="1"/>
+              <a:t>CountryId</a:t>
+            </a:r>
+            <a:r>
+              <a:rPr lang="en-US" altLang="zh-CN" sz="1600" dirty="0"/>
+              <a:t>&gt;</a:t>
+            </a:r>
+          </a:p>
+          <a:p>
+            <a:r>
+              <a:rPr lang="en-US" altLang="zh-CN" sz="1600" dirty="0"/>
+              <a:t>        &lt;</a:t>
+            </a:r>
+            <a:r>
+              <a:rPr lang="en-US" altLang="zh-CN" sz="1600" dirty="0" err="1"/>
+              <a:t>CountryName</a:t>
+            </a:r>
+            <a:r>
+              <a:rPr lang="en-US" altLang="zh-CN" sz="1600" dirty="0"/>
+              <a:t>&gt;</a:t>
+            </a:r>
+            <a:r>
+              <a:rPr lang="zh-CN" altLang="en-US" sz="1600" dirty="0"/>
+              <a:t>法国</a:t>
+            </a:r>
+            <a:r>
+              <a:rPr lang="en-US" altLang="zh-CN" sz="1600" dirty="0"/>
+              <a:t>&lt;/</a:t>
+            </a:r>
+            <a:r>
+              <a:rPr lang="en-US" altLang="zh-CN" sz="1600" dirty="0" err="1"/>
+              <a:t>CountryName</a:t>
+            </a:r>
+            <a:r>
+              <a:rPr lang="en-US" altLang="zh-CN" sz="1600" dirty="0"/>
+              <a:t>&gt;</a:t>
+            </a:r>
+          </a:p>
+          <a:p>
+            <a:r>
+              <a:rPr lang="en-US" altLang="zh-CN" sz="1600" dirty="0"/>
+              <a:t>      &lt;/</a:t>
+            </a:r>
+            <a:r>
+              <a:rPr lang="en-US" altLang="zh-CN" sz="1600" dirty="0" err="1"/>
+              <a:t>CountryItem</a:t>
+            </a:r>
+            <a:r>
+              <a:rPr lang="en-US" altLang="zh-CN" sz="1600" dirty="0"/>
+              <a:t>&gt;</a:t>
+            </a:r>
+          </a:p>
+          <a:p>
+            <a:r>
+              <a:rPr lang="en-US" altLang="zh-CN" sz="1600" dirty="0"/>
+              <a:t>      &lt;</a:t>
+            </a:r>
+            <a:r>
+              <a:rPr lang="en-US" altLang="zh-CN" sz="1600" dirty="0" err="1"/>
+              <a:t>CountryItem</a:t>
+            </a:r>
+            <a:r>
+              <a:rPr lang="en-US" altLang="zh-CN" sz="1600" dirty="0"/>
+              <a:t>&gt;</a:t>
+            </a:r>
+          </a:p>
+          <a:p>
+            <a:r>
+              <a:rPr lang="en-US" altLang="zh-CN" sz="1600" dirty="0"/>
+              <a:t>        &lt;</a:t>
+            </a:r>
+            <a:r>
+              <a:rPr lang="en-US" altLang="zh-CN" sz="1600" dirty="0" err="1"/>
+              <a:t>CountryId</a:t>
+            </a:r>
+            <a:r>
+              <a:rPr lang="en-US" altLang="zh-CN" sz="1600" dirty="0"/>
+              <a:t>&gt;F131E0B172DC4CD7B323F08940DB2DB6&lt;/</a:t>
+            </a:r>
+            <a:r>
+              <a:rPr lang="en-US" altLang="zh-CN" sz="1600" dirty="0" err="1"/>
+              <a:t>CountryId</a:t>
+            </a:r>
+            <a:r>
+              <a:rPr lang="en-US" altLang="zh-CN" sz="1600" dirty="0"/>
+              <a:t>&gt;</a:t>
+            </a:r>
+          </a:p>
+          <a:p>
+            <a:r>
+              <a:rPr lang="en-US" altLang="zh-CN" sz="1600" dirty="0"/>
+              <a:t>        &lt;</a:t>
+            </a:r>
+            <a:r>
+              <a:rPr lang="en-US" altLang="zh-CN" sz="1600" dirty="0" err="1"/>
+              <a:t>CountryName</a:t>
+            </a:r>
+            <a:r>
+              <a:rPr lang="en-US" altLang="zh-CN" sz="1600" dirty="0"/>
+              <a:t>&gt;</a:t>
+            </a:r>
+            <a:r>
+              <a:rPr lang="zh-CN" altLang="en-US" sz="1600" dirty="0"/>
+              <a:t>德国</a:t>
+            </a:r>
+            <a:r>
+              <a:rPr lang="en-US" altLang="zh-CN" sz="1600" dirty="0"/>
+              <a:t>&lt;/</a:t>
+            </a:r>
+            <a:r>
+              <a:rPr lang="en-US" altLang="zh-CN" sz="1600" dirty="0" err="1"/>
+              <a:t>CountryName</a:t>
+            </a:r>
+            <a:r>
+              <a:rPr lang="en-US" altLang="zh-CN" sz="1600" dirty="0"/>
+              <a:t>&gt;</a:t>
+            </a:r>
+          </a:p>
+          <a:p>
+            <a:r>
+              <a:rPr lang="en-US" altLang="zh-CN" sz="1600" dirty="0"/>
+              <a:t>      &lt;/</a:t>
+            </a:r>
+            <a:r>
+              <a:rPr lang="en-US" altLang="zh-CN" sz="1600" dirty="0" err="1"/>
+              <a:t>CountryItem</a:t>
+            </a:r>
+            <a:r>
+              <a:rPr lang="en-US" altLang="zh-CN" sz="1600" dirty="0"/>
+              <a:t>&gt;</a:t>
+            </a:r>
+          </a:p>
+          <a:p>
+            <a:r>
+              <a:rPr lang="en-US" altLang="zh-CN" sz="1600" dirty="0"/>
+              <a:t>    &lt;/</a:t>
+            </a:r>
+            <a:r>
+              <a:rPr lang="en-US" altLang="zh-CN" sz="1600" dirty="0" err="1"/>
+              <a:t>CountryItemList</a:t>
+            </a:r>
+            <a:r>
+              <a:rPr lang="en-US" altLang="zh-CN" sz="1600" dirty="0"/>
+              <a:t>&gt;</a:t>
+            </a:r>
+          </a:p>
+          <a:p>
+            <a:r>
+              <a:rPr lang="en-US" altLang="zh-CN" sz="1600" dirty="0"/>
+              <a:t>  &lt;/Result&gt;</a:t>
+            </a:r>
+          </a:p>
+          <a:p>
+            <a:r>
+              <a:rPr lang="en-US" altLang="zh-CN" sz="1600" dirty="0"/>
+              <a:t>&lt;/Response&gt;</a:t>
+            </a:r>
+            <a:endParaRPr lang="zh-CN" altLang="en-US" sz="1600" dirty="0"/>
+          </a:p>
+        </p:txBody>
+      </p:sp>
+    </p:spTree>
+    <p:extLst>
+      <p:ext uri="{BB962C8B-B14F-4D97-AF65-F5344CB8AC3E}">
+        <p14:creationId xmlns:p14="http://schemas.microsoft.com/office/powerpoint/2010/main" val="91963905"/>
+      </p:ext>
+    </p:extLst>
+  </p:cSld>
+  <p:clrMapOvr>
+    <a:masterClrMapping/>
+  </p:clrMapOvr>
+  <p:timing>
+    <p:tnLst>
+      <p:par>
+        <p:cTn id="1" dur="indefinite" restart="never" nodeType="tmRoot"/>
+      </p:par>
+    </p:tnLst>
+  </p:timing>
+</p:sld>
+</file>
+
+<file path=ppt/slides/slide15.xml><?xml version="1.0" encoding="utf-8"?>
+<p:sld xmlns:a="http://schemas.openxmlformats.org/drawingml/2006/main" xmlns:r="http://schemas.openxmlformats.org/officeDocument/2006/relationships" xmlns:p="http://schemas.openxmlformats.org/presentationml/2006/main">
+  <p:cSld>
+    <p:spTree>
+      <p:nvGrpSpPr>
+        <p:cNvPr id="1" name=""/>
+        <p:cNvGrpSpPr/>
+        <p:nvPr/>
+      </p:nvGrpSpPr>
+      <p:grpSpPr>
+        <a:xfrm>
+          <a:off x="0" y="0"/>
+          <a:ext cx="0" cy="0"/>
+          <a:chOff x="0" y="0"/>
+          <a:chExt cx="0" cy="0"/>
+        </a:xfrm>
+      </p:grpSpPr>
+      <p:sp>
+        <p:nvSpPr>
+          <p:cNvPr id="2" name="标题 1"/>
+          <p:cNvSpPr>
+            <a:spLocks noGrp="1"/>
+          </p:cNvSpPr>
+          <p:nvPr>
+            <p:ph type="title"/>
+          </p:nvPr>
+        </p:nvSpPr>
+        <p:spPr/>
+        <p:txBody>
+          <a:bodyPr/>
+          <a:lstStyle/>
+          <a:p>
+            <a:r>
+              <a:rPr lang="zh-CN" altLang="en-US" dirty="0" smtClean="0"/>
+              <a:t>集成第三</a:t>
+            </a:r>
+            <a:r>
+              <a:rPr lang="zh-CN" altLang="en-US" dirty="0"/>
+              <a:t>方</a:t>
+            </a:r>
+            <a:r>
+              <a:rPr lang="en-US" altLang="zh-CN" dirty="0" smtClean="0"/>
+              <a:t>API</a:t>
+            </a:r>
+            <a:endParaRPr lang="zh-CN" altLang="en-US" dirty="0"/>
+          </a:p>
+        </p:txBody>
+      </p:sp>
+      <p:sp>
+        <p:nvSpPr>
+          <p:cNvPr id="3" name="内容占位符 2"/>
+          <p:cNvSpPr>
+            <a:spLocks noGrp="1"/>
+          </p:cNvSpPr>
+          <p:nvPr>
+            <p:ph idx="1"/>
+          </p:nvPr>
+        </p:nvSpPr>
+        <p:spPr/>
+        <p:txBody>
+          <a:bodyPr/>
+          <a:lstStyle/>
+          <a:p>
+            <a:r>
+              <a:rPr lang="zh-CN" altLang="en-US" dirty="0" smtClean="0"/>
+              <a:t>搜狗地图</a:t>
+            </a:r>
+            <a:endParaRPr lang="en-US" altLang="zh-CN" dirty="0" smtClean="0"/>
+          </a:p>
+          <a:p>
+            <a:pPr lvl="1"/>
+            <a:r>
+              <a:rPr lang="zh-CN" altLang="en-US" dirty="0"/>
+              <a:t>静态</a:t>
+            </a:r>
+            <a:r>
+              <a:rPr lang="zh-CN" altLang="en-US" dirty="0" smtClean="0"/>
+              <a:t>图</a:t>
+            </a:r>
+            <a:r>
+              <a:rPr lang="en-US" altLang="zh-CN" dirty="0" smtClean="0"/>
+              <a:t>API</a:t>
+            </a:r>
+            <a:r>
+              <a:rPr lang="zh-CN" altLang="en-US" dirty="0" smtClean="0"/>
+              <a:t>：关键字</a:t>
+            </a:r>
+            <a:r>
+              <a:rPr lang="en-US" altLang="zh-CN" dirty="0" smtClean="0"/>
+              <a:t>-&gt;</a:t>
+            </a:r>
+            <a:r>
+              <a:rPr lang="zh-CN" altLang="en-US" dirty="0" smtClean="0"/>
+              <a:t>图片</a:t>
+            </a:r>
+            <a:endParaRPr lang="en-US" altLang="zh-CN" dirty="0" smtClean="0"/>
+          </a:p>
+          <a:p>
+            <a:r>
+              <a:rPr lang="zh-CN" altLang="en-US" dirty="0"/>
+              <a:t>腾讯微</a:t>
+            </a:r>
+            <a:r>
+              <a:rPr lang="zh-CN" altLang="en-US" dirty="0" smtClean="0"/>
+              <a:t>博</a:t>
+            </a:r>
+            <a:endParaRPr lang="en-US" altLang="zh-CN" dirty="0" smtClean="0"/>
+          </a:p>
+          <a:p>
+            <a:pPr lvl="1"/>
+            <a:r>
+              <a:rPr lang="zh-CN" altLang="en-US" dirty="0"/>
+              <a:t>撰写</a:t>
+            </a:r>
+            <a:r>
+              <a:rPr lang="zh-CN" altLang="en-US" dirty="0" smtClean="0"/>
+              <a:t>微博、上传图片</a:t>
+            </a:r>
+            <a:endParaRPr lang="en-US" altLang="zh-CN" dirty="0" smtClean="0"/>
+          </a:p>
+          <a:p>
+            <a:r>
+              <a:rPr lang="zh-CN" altLang="en-US" dirty="0" smtClean="0"/>
+              <a:t>不</a:t>
+            </a:r>
+            <a:r>
+              <a:rPr lang="zh-CN" altLang="en-US" dirty="0"/>
+              <a:t>开</a:t>
+            </a:r>
+            <a:r>
+              <a:rPr lang="zh-CN" altLang="en-US" dirty="0" smtClean="0"/>
+              <a:t>源的</a:t>
+            </a:r>
+            <a:r>
+              <a:rPr lang="en-US" altLang="zh-CN" dirty="0" smtClean="0"/>
+              <a:t>JAR</a:t>
+            </a:r>
+            <a:r>
+              <a:rPr lang="zh-CN" altLang="en-US" dirty="0" smtClean="0"/>
+              <a:t>、</a:t>
+            </a:r>
+            <a:r>
+              <a:rPr lang="en-US" altLang="zh-CN" dirty="0" smtClean="0"/>
+              <a:t>DLL</a:t>
+            </a:r>
+            <a:r>
+              <a:rPr lang="zh-CN" altLang="en-US" dirty="0" smtClean="0"/>
+              <a:t>或</a:t>
+            </a:r>
+            <a:r>
+              <a:rPr lang="en-US" altLang="zh-CN" dirty="0" smtClean="0"/>
+              <a:t>Web Service</a:t>
+            </a:r>
+            <a:r>
+              <a:rPr lang="zh-CN" altLang="en-US" dirty="0" smtClean="0"/>
+              <a:t>比较难调试</a:t>
+            </a:r>
+            <a:endParaRPr lang="zh-CN" altLang="en-US" dirty="0"/>
+          </a:p>
+        </p:txBody>
+      </p:sp>
+    </p:spTree>
+    <p:extLst>
+      <p:ext uri="{BB962C8B-B14F-4D97-AF65-F5344CB8AC3E}">
+        <p14:creationId xmlns:p14="http://schemas.microsoft.com/office/powerpoint/2010/main" val="2416407977"/>
+      </p:ext>
+    </p:extLst>
+  </p:cSld>
+  <p:clrMapOvr>
+    <a:masterClrMapping/>
+  </p:clrMapOvr>
+  <p:timing>
+    <p:tnLst>
+      <p:par>
+        <p:cTn id="1" dur="indefinite" restart="never" nodeType="tmRoot"/>
+      </p:par>
+    </p:tnLst>
+  </p:timing>
+</p:sld>
+</file>
+
+<file path=ppt/slides/slide16.xml><?xml version="1.0" encoding="utf-8"?>
+<p:sld xmlns:a="http://schemas.openxmlformats.org/drawingml/2006/main" xmlns:r="http://schemas.openxmlformats.org/officeDocument/2006/relationships" xmlns:p="http://schemas.openxmlformats.org/presentationml/2006/main">
+  <p:cSld>
+    <p:spTree>
+      <p:nvGrpSpPr>
+        <p:cNvPr id="1" name=""/>
+        <p:cNvGrpSpPr/>
+        <p:nvPr/>
+      </p:nvGrpSpPr>
+      <p:grpSpPr>
+        <a:xfrm>
+          <a:off x="0" y="0"/>
+          <a:ext cx="0" cy="0"/>
+          <a:chOff x="0" y="0"/>
+          <a:chExt cx="0" cy="0"/>
+        </a:xfrm>
+      </p:grpSpPr>
+      <p:sp>
+        <p:nvSpPr>
+          <p:cNvPr id="2" name="标题 1"/>
+          <p:cNvSpPr>
+            <a:spLocks noGrp="1"/>
+          </p:cNvSpPr>
+          <p:nvPr>
+            <p:ph type="title"/>
+          </p:nvPr>
+        </p:nvSpPr>
+        <p:spPr/>
+        <p:txBody>
+          <a:bodyPr/>
+          <a:lstStyle/>
+          <a:p>
+            <a:r>
+              <a:rPr lang="zh-CN" altLang="en-US" dirty="0" smtClean="0"/>
+              <a:t>心得体会</a:t>
+            </a:r>
+            <a:endParaRPr lang="zh-CN" altLang="en-US" dirty="0"/>
+          </a:p>
+        </p:txBody>
+      </p:sp>
+      <p:sp>
+        <p:nvSpPr>
+          <p:cNvPr id="3" name="内容占位符 2"/>
+          <p:cNvSpPr>
+            <a:spLocks noGrp="1"/>
+          </p:cNvSpPr>
+          <p:nvPr>
+            <p:ph idx="1"/>
+          </p:nvPr>
+        </p:nvSpPr>
+        <p:spPr/>
+        <p:txBody>
+          <a:bodyPr/>
+          <a:lstStyle/>
+          <a:p>
+            <a:r>
+              <a:rPr lang="en-US" altLang="zh-CN" dirty="0" err="1" smtClean="0"/>
+              <a:t>GitHub</a:t>
+            </a:r>
+            <a:endParaRPr lang="en-US" altLang="zh-CN" dirty="0" smtClean="0"/>
+          </a:p>
+          <a:p>
+            <a:pPr lvl="1"/>
+            <a:r>
+              <a:rPr lang="en-US" altLang="zh-CN" dirty="0" smtClean="0"/>
+              <a:t>http://github.com/ggxx/SextantTG</a:t>
+            </a:r>
+            <a:r>
+              <a:rPr lang="en-US" altLang="zh-CN" dirty="0" smtClean="0"/>
+              <a:t>/</a:t>
+            </a:r>
+          </a:p>
+          <a:p>
+            <a:pPr lvl="1"/>
+            <a:r>
+              <a:rPr lang="zh-CN" altLang="en-US" dirty="0" smtClean="0"/>
+              <a:t>欢迎</a:t>
+            </a:r>
+            <a:r>
+              <a:rPr lang="en-US" altLang="zh-CN" dirty="0" smtClean="0"/>
+              <a:t>Fork</a:t>
+            </a:r>
+          </a:p>
+          <a:p>
+            <a:pPr lvl="2"/>
+            <a:r>
+              <a:rPr lang="en-US" altLang="zh-CN" dirty="0" smtClean="0"/>
+              <a:t>80% C#</a:t>
+            </a:r>
+            <a:r>
+              <a:rPr lang="zh-CN" altLang="en-US" dirty="0"/>
+              <a:t>；</a:t>
+            </a:r>
+            <a:r>
+              <a:rPr lang="zh-CN" altLang="en-US" dirty="0" smtClean="0"/>
+              <a:t> </a:t>
+            </a:r>
+            <a:endParaRPr lang="en-US" altLang="zh-CN" dirty="0" smtClean="0"/>
+          </a:p>
+          <a:p>
+            <a:pPr lvl="2"/>
+            <a:r>
+              <a:rPr lang="en-US" altLang="zh-CN" dirty="0" smtClean="0"/>
+              <a:t>15% Java</a:t>
+            </a:r>
+            <a:r>
+              <a:rPr lang="zh-CN" altLang="en-US" dirty="0" smtClean="0"/>
+              <a:t>； </a:t>
+            </a:r>
+            <a:endParaRPr lang="en-US" altLang="zh-CN" dirty="0" smtClean="0"/>
+          </a:p>
+          <a:p>
+            <a:pPr lvl="2"/>
+            <a:r>
+              <a:rPr lang="en-US" altLang="zh-CN" dirty="0" smtClean="0"/>
+              <a:t>5% Others</a:t>
+            </a:r>
+            <a:r>
+              <a:rPr lang="zh-CN" altLang="en-US" dirty="0" smtClean="0"/>
+              <a:t>（</a:t>
+            </a:r>
+            <a:r>
+              <a:rPr lang="en-US" altLang="zh-CN" dirty="0" err="1"/>
+              <a:t>sql</a:t>
+            </a:r>
+            <a:r>
+              <a:rPr lang="zh-CN" altLang="en-US" dirty="0" smtClean="0"/>
+              <a:t>、</a:t>
+            </a:r>
+            <a:r>
+              <a:rPr lang="en-US" altLang="zh-CN" dirty="0" smtClean="0"/>
+              <a:t>bat</a:t>
+            </a:r>
+            <a:r>
+              <a:rPr lang="zh-CN" altLang="en-US" dirty="0" smtClean="0"/>
+              <a:t>、</a:t>
+            </a:r>
+            <a:r>
+              <a:rPr lang="en-US" altLang="zh-CN" dirty="0" smtClean="0"/>
+              <a:t>…</a:t>
+            </a:r>
+            <a:r>
+              <a:rPr lang="zh-CN" altLang="en-US" dirty="0" smtClean="0"/>
+              <a:t>）</a:t>
+            </a:r>
+            <a:endParaRPr lang="en-US" altLang="zh-CN" dirty="0" smtClean="0"/>
+          </a:p>
+          <a:p>
+            <a:r>
+              <a:rPr lang="en-US" altLang="zh-CN" dirty="0" smtClean="0"/>
+              <a:t>Tools</a:t>
+            </a:r>
+          </a:p>
+          <a:p>
+            <a:pPr lvl="1"/>
+            <a:r>
+              <a:rPr lang="zh-CN" altLang="en-US" dirty="0" smtClean="0"/>
+              <a:t>选择好用的第三方工具</a:t>
+            </a:r>
+            <a:endParaRPr lang="en-US" altLang="zh-CN" dirty="0" smtClean="0"/>
+          </a:p>
+          <a:p>
+            <a:r>
+              <a:rPr lang="zh-CN" altLang="en-US" dirty="0"/>
+              <a:t>分工合作</a:t>
+            </a:r>
+            <a:endParaRPr lang="en-US" altLang="zh-CN" dirty="0" smtClean="0"/>
+          </a:p>
+        </p:txBody>
+      </p:sp>
+    </p:spTree>
+  </p:cSld>
+  <p:clrMapOvr>
+    <a:masterClrMapping/>
+  </p:clrMapOvr>
+  <p:timing>
+    <p:tnLst>
+      <p:par>
+        <p:cTn id="1" dur="indefinite" restart="never" nodeType="tmRoot"/>
+      </p:par>
+    </p:tnLst>
+  </p:timing>
+</p:sld>
+</file>
+
+<file path=ppt/slides/slide17.xml><?xml version="1.0" encoding="utf-8"?>
+<p:sld xmlns:a="http://schemas.openxmlformats.org/drawingml/2006/main" xmlns:r="http://schemas.openxmlformats.org/officeDocument/2006/relationships" xmlns:p="http://schemas.openxmlformats.org/presentationml/2006/main">
+  <p:cSld>
+    <p:spTree>
+      <p:nvGrpSpPr>
+        <p:cNvPr id="1" name=""/>
+        <p:cNvGrpSpPr/>
+        <p:nvPr/>
+      </p:nvGrpSpPr>
+      <p:grpSpPr>
+        <a:xfrm>
+          <a:off x="0" y="0"/>
+          <a:ext cx="0" cy="0"/>
+          <a:chOff x="0" y="0"/>
+          <a:chExt cx="0" cy="0"/>
+        </a:xfrm>
+      </p:grpSpPr>
+      <p:sp>
+        <p:nvSpPr>
+          <p:cNvPr id="2" name="标题 1"/>
+          <p:cNvSpPr>
+            <a:spLocks noGrp="1"/>
+          </p:cNvSpPr>
+          <p:nvPr>
+            <p:ph type="title"/>
+          </p:nvPr>
+        </p:nvSpPr>
+        <p:spPr/>
+        <p:txBody>
+          <a:bodyPr/>
+          <a:lstStyle/>
+          <a:p>
+            <a:r>
+              <a:rPr lang="zh-CN" altLang="en-US" dirty="0" smtClean="0"/>
+              <a:t>演示</a:t>
+            </a:r>
+            <a:endParaRPr lang="zh-CN" altLang="en-US" dirty="0"/>
+          </a:p>
+        </p:txBody>
+      </p:sp>
+      <p:sp>
+        <p:nvSpPr>
+          <p:cNvPr id="3" name="内容占位符 2"/>
+          <p:cNvSpPr>
+            <a:spLocks noGrp="1"/>
+          </p:cNvSpPr>
+          <p:nvPr>
+            <p:ph idx="1"/>
+          </p:nvPr>
+        </p:nvSpPr>
+        <p:spPr/>
+        <p:txBody>
+          <a:bodyPr/>
+          <a:lstStyle/>
+          <a:p>
+            <a:endParaRPr lang="zh-CN" altLang="en-US"/>
+          </a:p>
+        </p:txBody>
+      </p:sp>
+    </p:spTree>
+  </p:cSld>
+  <p:clrMapOvr>
+    <a:masterClrMapping/>
+  </p:clrMapOvr>
+</p:sld>
+</file>
+
+<file path=ppt/slides/slide18.xml><?xml version="1.0" encoding="utf-8"?>
+<p:sld xmlns:a="http://schemas.openxmlformats.org/drawingml/2006/main" xmlns:r="http://schemas.openxmlformats.org/officeDocument/2006/relationships" xmlns:p="http://schemas.openxmlformats.org/presentationml/2006/main">
+  <p:cSld>
+    <p:spTree>
+      <p:nvGrpSpPr>
+        <p:cNvPr id="1" name=""/>
+        <p:cNvGrpSpPr/>
+        <p:nvPr/>
+      </p:nvGrpSpPr>
+      <p:grpSpPr>
+        <a:xfrm>
+          <a:off x="0" y="0"/>
+          <a:ext cx="0" cy="0"/>
+          <a:chOff x="0" y="0"/>
+          <a:chExt cx="0" cy="0"/>
+        </a:xfrm>
+      </p:grpSpPr>
+      <p:sp>
+        <p:nvSpPr>
+          <p:cNvPr id="2" name="标题 1"/>
+          <p:cNvSpPr>
+            <a:spLocks noGrp="1"/>
+          </p:cNvSpPr>
+          <p:nvPr>
+            <p:ph type="title"/>
+          </p:nvPr>
+        </p:nvSpPr>
+        <p:spPr/>
+        <p:txBody>
+          <a:bodyPr/>
+          <a:lstStyle/>
+          <a:p>
+            <a:r>
+              <a:rPr lang="zh-CN" altLang="en-US" dirty="0"/>
+              <a:t>谢谢</a:t>
             </a:r>
             <a:endParaRPr lang="zh-CN" altLang="en-US" dirty="0"/>
           </a:p>
@@ -4243,38 +6185,49 @@
         </p:nvSpPr>
         <p:spPr/>
         <p:txBody>
+          <a:bodyPr>
+            <a:normAutofit/>
+          </a:bodyPr>
+          <a:lstStyle/>
+          <a:p>
+            <a:r>
+              <a:rPr lang="zh-CN" altLang="en-US" dirty="0" smtClean="0"/>
+              <a:t>完成题目</a:t>
+            </a:r>
+            <a:endParaRPr lang="zh-CN" altLang="en-US" dirty="0"/>
+          </a:p>
+        </p:txBody>
+      </p:sp>
+      <p:sp>
+        <p:nvSpPr>
+          <p:cNvPr id="3" name="内容占位符 2"/>
+          <p:cNvSpPr>
+            <a:spLocks noGrp="1"/>
+          </p:cNvSpPr>
+          <p:nvPr>
+            <p:ph idx="1"/>
+          </p:nvPr>
+        </p:nvSpPr>
+        <p:spPr/>
+        <p:txBody>
           <a:bodyPr/>
           <a:lstStyle/>
           <a:p>
             <a:r>
-              <a:rPr lang="en-US" altLang="zh-CN" dirty="0" smtClean="0"/>
-              <a:t>Sextant Tour Guide</a:t>
-            </a:r>
-            <a:endParaRPr lang="zh-CN" altLang="en-US" dirty="0"/>
-          </a:p>
-        </p:txBody>
-      </p:sp>
-      <p:sp>
-        <p:nvSpPr>
-          <p:cNvPr id="3" name="内容占位符 2"/>
-          <p:cNvSpPr>
-            <a:spLocks noGrp="1"/>
-          </p:cNvSpPr>
-          <p:nvPr>
-            <p:ph idx="1"/>
-          </p:nvPr>
-        </p:nvSpPr>
-        <p:spPr/>
-        <p:txBody>
-          <a:bodyPr/>
-          <a:lstStyle/>
-          <a:p>
-            <a:r>
-              <a:rPr lang="en-US" altLang="zh-CN" dirty="0" smtClean="0"/>
-              <a:t>Sextant Studio</a:t>
-            </a:r>
-          </a:p>
-          <a:p>
+              <a:rPr lang="en-US" altLang="zh-CN" dirty="0"/>
+              <a:t>Sextant Tour </a:t>
+            </a:r>
+            <a:r>
+              <a:rPr lang="en-US" altLang="zh-CN" dirty="0" smtClean="0"/>
+              <a:t>Guide</a:t>
+            </a:r>
+          </a:p>
+          <a:p>
+            <a:pPr lvl="1"/>
+            <a:r>
+              <a:rPr lang="zh-CN" altLang="en-US" dirty="0" smtClean="0"/>
+              <a:t>六分仪旅行向导</a:t>
+            </a:r>
             <a:endParaRPr lang="zh-CN" altLang="en-US" dirty="0"/>
           </a:p>
         </p:txBody>
@@ -4339,45 +6292,112 @@
         </p:nvSpPr>
         <p:spPr/>
         <p:txBody>
-          <a:bodyPr/>
-          <a:lstStyle/>
-          <a:p>
-            <a:r>
-              <a:rPr lang="en-US" altLang="zh-CN" dirty="0" smtClean="0"/>
-              <a:t>Windows 7</a:t>
-            </a:r>
-          </a:p>
-          <a:p>
-            <a:r>
-              <a:rPr lang="en-US" altLang="zh-CN" dirty="0" smtClean="0"/>
-              <a:t>Visual Studio 2010 (.NET 3.5 SP1)</a:t>
-            </a:r>
-          </a:p>
-          <a:p>
-            <a:r>
-              <a:rPr lang="en-US" altLang="zh-CN" dirty="0" err="1" smtClean="0"/>
+          <a:bodyPr>
+            <a:normAutofit lnSpcReduction="10000"/>
+          </a:bodyPr>
+          <a:lstStyle/>
+          <a:p>
+            <a:r>
+              <a:rPr lang="en-US" altLang="zh-CN" dirty="0" smtClean="0"/>
+              <a:t>Sever</a:t>
+            </a:r>
+          </a:p>
+          <a:p>
+            <a:pPr lvl="1"/>
+            <a:r>
+              <a:rPr lang="en-US" altLang="zh-CN" dirty="0" smtClean="0"/>
+              <a:t>Windows</a:t>
+            </a:r>
+            <a:endParaRPr lang="en-US" altLang="zh-CN" dirty="0" smtClean="0"/>
+          </a:p>
+          <a:p>
+            <a:pPr lvl="1"/>
+            <a:r>
+              <a:rPr lang="en-US" altLang="zh-CN" dirty="0" smtClean="0"/>
+              <a:t>Visual Studio 2010 (.NET </a:t>
+            </a:r>
+            <a:r>
+              <a:rPr lang="en-US" altLang="zh-CN" dirty="0" smtClean="0"/>
+              <a:t>3.5)</a:t>
+            </a:r>
+          </a:p>
+          <a:p>
+            <a:pPr lvl="1"/>
+            <a:r>
+              <a:rPr lang="en-US" altLang="zh-CN" smtClean="0"/>
               <a:t>SQLite</a:t>
             </a:r>
             <a:endParaRPr lang="en-US" altLang="zh-CN" dirty="0" smtClean="0"/>
           </a:p>
           <a:p>
             <a:r>
-              <a:rPr lang="en-US" altLang="zh-CN" dirty="0" err="1" smtClean="0"/>
+              <a:rPr lang="en-US" altLang="zh-CN" dirty="0" smtClean="0"/>
+              <a:t>Client</a:t>
+            </a:r>
+          </a:p>
+          <a:p>
+            <a:pPr lvl="1"/>
+            <a:r>
+              <a:rPr lang="en-US" altLang="zh-CN" dirty="0" smtClean="0"/>
+              <a:t>PC</a:t>
+            </a:r>
+          </a:p>
+          <a:p>
+            <a:pPr lvl="2"/>
+            <a:r>
+              <a:rPr lang="en-US" altLang="zh-CN" dirty="0" smtClean="0"/>
+              <a:t>Windows</a:t>
+            </a:r>
+            <a:r>
+              <a:rPr lang="zh-CN" altLang="en-US" dirty="0" smtClean="0"/>
+              <a:t>、</a:t>
+            </a:r>
+            <a:r>
+              <a:rPr lang="en-US" altLang="zh-CN" dirty="0" smtClean="0"/>
+              <a:t> .</a:t>
+            </a:r>
+            <a:r>
+              <a:rPr lang="en-US" altLang="zh-CN" dirty="0"/>
+              <a:t>NET </a:t>
+            </a:r>
+            <a:r>
+              <a:rPr lang="en-US" altLang="zh-CN" dirty="0" smtClean="0"/>
+              <a:t>3.5</a:t>
+            </a:r>
+            <a:endParaRPr lang="en-US" altLang="zh-CN" dirty="0" smtClean="0"/>
+          </a:p>
+          <a:p>
+            <a:pPr lvl="1"/>
+            <a:r>
+              <a:rPr lang="en-US" altLang="zh-CN" dirty="0" smtClean="0"/>
+              <a:t>Mobile</a:t>
+            </a:r>
+          </a:p>
+          <a:p>
+            <a:pPr lvl="2"/>
+            <a:r>
+              <a:rPr lang="en-US" altLang="zh-CN" dirty="0" smtClean="0"/>
+              <a:t>Android4.0+</a:t>
+            </a:r>
+            <a:r>
+              <a:rPr lang="zh-CN" altLang="en-US" dirty="0" smtClean="0"/>
+              <a:t>、</a:t>
+            </a:r>
+            <a:r>
+              <a:rPr lang="en-US" altLang="zh-CN" dirty="0" smtClean="0"/>
+              <a:t>Eclipse</a:t>
+            </a:r>
+          </a:p>
+          <a:p>
+            <a:r>
+              <a:rPr lang="en-US" altLang="zh-CN" dirty="0" err="1"/>
               <a:t>GitHub</a:t>
             </a:r>
+            <a:endParaRPr lang="en-US" altLang="zh-CN" dirty="0"/>
+          </a:p>
+          <a:p>
+            <a:pPr lvl="1"/>
             <a:endParaRPr lang="en-US" altLang="zh-CN" dirty="0" smtClean="0"/>
-          </a:p>
-          <a:p>
-            <a:r>
-              <a:rPr lang="en-US" altLang="zh-CN" dirty="0" smtClean="0"/>
-              <a:t>Spring. NET</a:t>
-            </a:r>
-          </a:p>
-          <a:p>
-            <a:r>
-              <a:rPr lang="en-US" altLang="zh-CN" dirty="0" smtClean="0"/>
-              <a:t>Log4Net</a:t>
-            </a:r>
           </a:p>
         </p:txBody>
       </p:sp>
@@ -4386,6 +6406,13 @@
   <p:clrMapOvr>
     <a:masterClrMapping/>
   </p:clrMapOvr>
+  <p:timing>
+    <p:tnLst>
+      <p:par>
+        <p:cTn id="1" dur="indefinite" restart="never" nodeType="tmRoot"/>
+      </p:par>
+    </p:tnLst>
+  </p:timing>
 </p:sld>
 </file>
 
@@ -4439,7 +6466,12 @@
             <p:ph idx="1"/>
           </p:nvPr>
         </p:nvSpPr>
-        <p:spPr/>
+        <p:spPr>
+          <a:xfrm>
+            <a:off x="457200" y="1935480"/>
+            <a:ext cx="4114800" cy="4389120"/>
+          </a:xfrm>
+        </p:spPr>
         <p:txBody>
           <a:bodyPr/>
           <a:lstStyle/>
@@ -4451,16 +6483,25 @@
           </a:p>
           <a:p>
             <a:r>
+              <a:rPr lang="en-US" altLang="zh-CN" dirty="0" smtClean="0"/>
+              <a:t>IDAL</a:t>
+            </a:r>
+          </a:p>
+          <a:p>
+            <a:pPr lvl="1"/>
+            <a:r>
               <a:rPr lang="en-US" altLang="zh-CN" dirty="0" err="1" smtClean="0"/>
-              <a:t>ActiveRecord</a:t>
+              <a:t>SQLiteDAL</a:t>
+            </a:r>
+            <a:r>
+              <a:rPr lang="zh-CN" altLang="en-US" dirty="0" smtClean="0"/>
+              <a:t>、</a:t>
+            </a:r>
+            <a:r>
+              <a:rPr lang="en-US" altLang="zh-CN" dirty="0" err="1" smtClean="0"/>
+              <a:t>OracleDAL</a:t>
             </a:r>
             <a:endParaRPr lang="en-US" altLang="zh-CN" dirty="0" smtClean="0"/>
-          </a:p>
-          <a:p>
-            <a:r>
-              <a:rPr lang="en-US" altLang="zh-CN" dirty="0" smtClean="0"/>
-              <a:t>IDAL</a:t>
-            </a:r>
           </a:p>
           <a:p>
             <a:r>
@@ -4470,24 +6511,99 @@
             <a:endParaRPr lang="en-US" altLang="zh-CN" dirty="0" smtClean="0"/>
           </a:p>
           <a:p>
-            <a:r>
-              <a:rPr lang="en-US" altLang="zh-CN" dirty="0" smtClean="0"/>
-              <a:t>UI</a:t>
-            </a:r>
-          </a:p>
-          <a:p>
-            <a:r>
-              <a:rPr lang="en-US" altLang="zh-CN" dirty="0" smtClean="0"/>
-              <a:t>Utility</a:t>
-            </a:r>
-          </a:p>
-        </p:txBody>
-      </p:sp>
+            <a:pPr lvl="1"/>
+            <a:r>
+              <a:rPr lang="en-US" altLang="zh-CN" dirty="0" smtClean="0"/>
+              <a:t>Service</a:t>
+            </a:r>
+          </a:p>
+          <a:p>
+            <a:r>
+              <a:rPr lang="en-US" altLang="zh-CN" dirty="0" smtClean="0"/>
+              <a:t>Web Service + DTO</a:t>
+            </a:r>
+          </a:p>
+          <a:p>
+            <a:r>
+              <a:rPr lang="en-US" altLang="zh-CN" dirty="0" smtClean="0"/>
+              <a:t>Android Client</a:t>
+            </a:r>
+          </a:p>
+          <a:p>
+            <a:r>
+              <a:rPr lang="en-US" altLang="zh-CN" dirty="0" smtClean="0"/>
+              <a:t>PC Client</a:t>
+            </a:r>
+            <a:endParaRPr lang="en-US" altLang="zh-CN" dirty="0" smtClean="0"/>
+          </a:p>
+        </p:txBody>
+      </p:sp>
+      <p:pic>
+        <p:nvPicPr>
+          <p:cNvPr id="1026" name="Picture 2"/>
+          <p:cNvPicPr>
+            <a:picLocks noChangeAspect="1" noChangeArrowheads="1"/>
+          </p:cNvPicPr>
+          <p:nvPr/>
+        </p:nvPicPr>
+        <p:blipFill>
+          <a:blip r:embed="rId2">
+            <a:extLst>
+              <a:ext uri="{28A0092B-C50C-407E-A947-70E740481C1C}">
+                <a14:useLocalDpi xmlns:a14="http://schemas.microsoft.com/office/drawing/2010/main" val="0"/>
+              </a:ext>
+            </a:extLst>
+          </a:blip>
+          <a:srcRect/>
+          <a:stretch>
+            <a:fillRect/>
+          </a:stretch>
+        </p:blipFill>
+        <p:spPr bwMode="auto">
+          <a:xfrm>
+            <a:off x="5033655" y="2204864"/>
+            <a:ext cx="3609975" cy="3609975"/>
+          </a:xfrm>
+          <a:prstGeom prst="rect">
+            <a:avLst/>
+          </a:prstGeom>
+          <a:noFill/>
+          <a:ln>
+            <a:noFill/>
+          </a:ln>
+          <a:extLst>
+            <a:ext uri="{909E8E84-426E-40DD-AFC4-6F175D3DCCD1}">
+              <a14:hiddenFill xmlns:a14="http://schemas.microsoft.com/office/drawing/2010/main">
+                <a:solidFill>
+                  <a:schemeClr val="accent1"/>
+                </a:solidFill>
+              </a14:hiddenFill>
+            </a:ext>
+            <a:ext uri="{91240B29-F687-4F45-9708-019B960494DF}">
+              <a14:hiddenLine xmlns:a14="http://schemas.microsoft.com/office/drawing/2010/main" w="9525">
+                <a:solidFill>
+                  <a:schemeClr val="tx1"/>
+                </a:solidFill>
+                <a:miter lim="800000"/>
+                <a:headEnd/>
+                <a:tailEnd/>
+              </a14:hiddenLine>
+            </a:ext>
+          </a:extLst>
+        </p:spPr>
+      </p:pic>
     </p:spTree>
   </p:cSld>
   <p:clrMapOvr>
     <a:masterClrMapping/>
   </p:clrMapOvr>
+  <p:timing>
+    <p:tnLst>
+      <p:par>
+        <p:cTn id="1" dur="indefinite" restart="never" nodeType="tmRoot"/>
+      </p:par>
+    </p:tnLst>
+  </p:timing>
 </p:sld>
 </file>
 
@@ -4525,11 +6641,7 @@
           <a:p>
             <a:r>
               <a:rPr lang="zh-CN" altLang="en-US" dirty="0" smtClean="0"/>
-              <a:t>关于</a:t>
-            </a:r>
-            <a:r>
-              <a:rPr lang="en-US" altLang="zh-CN" dirty="0" smtClean="0"/>
-              <a:t>.NET</a:t>
+              <a:t>建模</a:t>
             </a:r>
             <a:endParaRPr lang="zh-CN" altLang="en-US" dirty="0"/>
           </a:p>
@@ -4547,14 +6659,99 @@
         </p:nvSpPr>
         <p:spPr/>
         <p:txBody>
-          <a:bodyPr/>
-          <a:lstStyle/>
-          <a:p>
-            <a:r>
-              <a:rPr lang="zh-CN" altLang="en-US" dirty="0" smtClean="0"/>
-              <a:t>反射</a:t>
-            </a:r>
-            <a:endParaRPr lang="zh-CN" altLang="en-US" dirty="0"/>
+          <a:bodyPr>
+            <a:normAutofit lnSpcReduction="10000"/>
+          </a:bodyPr>
+          <a:lstStyle/>
+          <a:p>
+            <a:r>
+              <a:rPr lang="zh-CN" altLang="en-US" dirty="0" smtClean="0"/>
+              <a:t>考虑到需求并不复杂，因此没必要建立复杂的领域模型（</a:t>
+            </a:r>
+            <a:r>
+              <a:rPr lang="en-US" altLang="zh-CN" dirty="0" smtClean="0"/>
+              <a:t>Domain Model</a:t>
+            </a:r>
+            <a:r>
+              <a:rPr lang="zh-CN" altLang="en-US" dirty="0" smtClean="0"/>
+              <a:t>）</a:t>
+            </a:r>
+            <a:endParaRPr lang="en-US" altLang="zh-CN" dirty="0" smtClean="0"/>
+          </a:p>
+          <a:p>
+            <a:r>
+              <a:rPr lang="zh-CN" altLang="en-US" dirty="0" smtClean="0"/>
+              <a:t>使用类似活动记录（</a:t>
+            </a:r>
+            <a:r>
+              <a:rPr lang="en-US" altLang="zh-CN" dirty="0" smtClean="0"/>
+              <a:t>Active Record</a:t>
+            </a:r>
+            <a:r>
+              <a:rPr lang="zh-CN" altLang="en-US" dirty="0"/>
+              <a:t>）</a:t>
+            </a:r>
+            <a:r>
+              <a:rPr lang="zh-CN" altLang="en-US" dirty="0" smtClean="0"/>
+              <a:t>的</a:t>
+            </a:r>
+            <a:r>
+              <a:rPr lang="zh-CN" altLang="en-US" dirty="0" smtClean="0"/>
+              <a:t>贫血（失血）模型</a:t>
+            </a:r>
+            <a:endParaRPr lang="en-US" altLang="zh-CN" dirty="0" smtClean="0"/>
+          </a:p>
+          <a:p>
+            <a:pPr lvl="1"/>
+            <a:r>
+              <a:rPr lang="zh-CN" altLang="en-US" dirty="0" smtClean="0"/>
+              <a:t>一个实体类，表示数据库中的一个表；</a:t>
+            </a:r>
+            <a:endParaRPr lang="en-US" altLang="zh-CN" dirty="0" smtClean="0"/>
+          </a:p>
+          <a:p>
+            <a:pPr lvl="1"/>
+            <a:r>
+              <a:rPr lang="zh-CN" altLang="en-US" dirty="0"/>
+              <a:t>一个实体类的属性</a:t>
+            </a:r>
+            <a:r>
+              <a:rPr lang="zh-CN" altLang="en-US" dirty="0" smtClean="0"/>
+              <a:t>，表示数据库中的表的一列，属性</a:t>
+            </a:r>
+            <a:r>
+              <a:rPr lang="zh-CN" altLang="en-US" dirty="0"/>
+              <a:t>的数据类型</a:t>
+            </a:r>
+            <a:r>
+              <a:rPr lang="zh-CN" altLang="en-US" dirty="0" smtClean="0"/>
+              <a:t>与列的数据类型对应；</a:t>
+            </a:r>
+            <a:endParaRPr lang="en-US" altLang="zh-CN" dirty="0" smtClean="0"/>
+          </a:p>
+          <a:p>
+            <a:pPr lvl="1"/>
+            <a:r>
+              <a:rPr lang="zh-CN" altLang="en-US" dirty="0" smtClean="0"/>
+              <a:t>一个实体类的实例（一个对象），表示数据库中的表的一行。</a:t>
+            </a:r>
+            <a:endParaRPr lang="en-US" altLang="zh-CN" dirty="0" smtClean="0"/>
+          </a:p>
+          <a:p>
+            <a:pPr lvl="1"/>
+            <a:r>
+              <a:rPr lang="zh-CN" altLang="en-US" dirty="0" smtClean="0"/>
+              <a:t>实体类仅包括属性，没有方法（贫血），方法在</a:t>
+            </a:r>
+            <a:r>
+              <a:rPr lang="en-US" altLang="zh-CN" dirty="0" smtClean="0"/>
+              <a:t>DAL</a:t>
+            </a:r>
+            <a:r>
+              <a:rPr lang="zh-CN" altLang="en-US" dirty="0" smtClean="0"/>
+              <a:t>中实现</a:t>
+            </a:r>
+            <a:endParaRPr lang="en-US" altLang="zh-CN" dirty="0" smtClean="0"/>
           </a:p>
         </p:txBody>
       </p:sp>
@@ -4563,6 +6760,13 @@
   <p:clrMapOvr>
     <a:masterClrMapping/>
   </p:clrMapOvr>
+  <p:timing>
+    <p:tnLst>
+      <p:par>
+        <p:cTn id="1" dur="indefinite" restart="never" nodeType="tmRoot"/>
+      </p:par>
+    </p:tnLst>
+  </p:timing>
 </p:sld>
 </file>
 
@@ -4595,12 +6799,14 @@
         </p:nvSpPr>
         <p:spPr/>
         <p:txBody>
-          <a:bodyPr/>
-          <a:lstStyle/>
-          <a:p>
-            <a:r>
-              <a:rPr lang="zh-CN" altLang="en-US" dirty="0" smtClean="0"/>
-              <a:t>建模</a:t>
+          <a:bodyPr>
+            <a:normAutofit/>
+          </a:bodyPr>
+          <a:lstStyle/>
+          <a:p>
+            <a:r>
+              <a:rPr lang="zh-CN" altLang="en-US" dirty="0" smtClean="0"/>
+              <a:t>主要设计模式</a:t>
             </a:r>
             <a:endParaRPr lang="zh-CN" altLang="en-US" dirty="0"/>
           </a:p>
@@ -4618,32 +6824,117 @@
         </p:nvSpPr>
         <p:spPr/>
         <p:txBody>
-          <a:bodyPr/>
-          <a:lstStyle/>
-          <a:p>
-            <a:r>
-              <a:rPr lang="zh-CN" altLang="en-US" dirty="0" smtClean="0"/>
-              <a:t>活动记录</a:t>
-            </a:r>
-            <a:r>
-              <a:rPr lang="en-US" altLang="zh-CN" dirty="0" smtClean="0"/>
-              <a:t>(Active Record)</a:t>
-            </a:r>
-          </a:p>
-          <a:p>
-            <a:r>
-              <a:rPr lang="zh-CN" altLang="en-US" dirty="0" smtClean="0"/>
-              <a:t>贫血</a:t>
-            </a:r>
-            <a:r>
-              <a:rPr lang="zh-CN" altLang="en-US" dirty="0" smtClean="0"/>
-              <a:t>模型</a:t>
-            </a:r>
-            <a:endParaRPr lang="zh-CN" altLang="en-US" dirty="0"/>
+          <a:bodyPr>
+            <a:normAutofit/>
+          </a:bodyPr>
+          <a:lstStyle/>
+          <a:p>
+            <a:r>
+              <a:rPr lang="en-US" altLang="zh-CN" dirty="0" smtClean="0"/>
+              <a:t>Template</a:t>
+            </a:r>
+          </a:p>
+          <a:p>
+            <a:pPr lvl="1"/>
+            <a:r>
+              <a:rPr lang="zh-CN" altLang="en-US" dirty="0" smtClean="0"/>
+              <a:t>不同实体类访问数据库的相似性</a:t>
+            </a:r>
+            <a:endParaRPr lang="en-US" altLang="zh-CN" dirty="0" smtClean="0"/>
+          </a:p>
+          <a:p>
+            <a:pPr lvl="1"/>
+            <a:r>
+              <a:rPr lang="en-US" altLang="zh-CN" dirty="0" smtClean="0"/>
+              <a:t>IDAL – </a:t>
+            </a:r>
+            <a:r>
+              <a:rPr lang="en-US" altLang="zh-CN" dirty="0" err="1" smtClean="0"/>
+              <a:t>AbstractDAL</a:t>
+            </a:r>
+            <a:r>
+              <a:rPr lang="en-US" altLang="zh-CN" dirty="0" smtClean="0"/>
+              <a:t> – (</a:t>
+            </a:r>
+            <a:r>
+              <a:rPr lang="en-US" altLang="zh-CN" dirty="0" err="1" smtClean="0"/>
+              <a:t>UserDAL</a:t>
+            </a:r>
+            <a:r>
+              <a:rPr lang="en-US" altLang="zh-CN" dirty="0" smtClean="0"/>
+              <a:t>, </a:t>
+            </a:r>
+            <a:r>
+              <a:rPr lang="en-US" altLang="zh-CN" dirty="0" err="1" smtClean="0"/>
+              <a:t>BlogDAL</a:t>
+            </a:r>
+            <a:r>
+              <a:rPr lang="en-US" altLang="zh-CN" dirty="0" smtClean="0"/>
+              <a:t>)</a:t>
+            </a:r>
+          </a:p>
+          <a:p>
+            <a:r>
+              <a:rPr lang="en-US" altLang="zh-CN" dirty="0" smtClean="0"/>
+              <a:t>Factory</a:t>
+            </a:r>
+          </a:p>
+          <a:p>
+            <a:pPr lvl="1"/>
+            <a:r>
+              <a:rPr lang="zh-CN" altLang="en-US" dirty="0" smtClean="0"/>
+              <a:t>去耦合，将对象的初始化信息放在配置文件中</a:t>
+            </a:r>
+            <a:endParaRPr lang="en-US" altLang="zh-CN" dirty="0" smtClean="0"/>
+          </a:p>
+          <a:p>
+            <a:pPr lvl="1"/>
+            <a:r>
+              <a:rPr lang="zh-CN" altLang="en-US" dirty="0" smtClean="0"/>
+              <a:t>充分利用</a:t>
+            </a:r>
+            <a:r>
+              <a:rPr lang="en-US" altLang="zh-CN" dirty="0" smtClean="0"/>
+              <a:t>.NET</a:t>
+            </a:r>
+            <a:r>
+              <a:rPr lang="zh-CN" altLang="en-US" dirty="0" smtClean="0"/>
+              <a:t>的反射机制</a:t>
+            </a:r>
+            <a:endParaRPr lang="en-US" altLang="zh-CN" dirty="0" smtClean="0"/>
+          </a:p>
+          <a:p>
+            <a:pPr lvl="1"/>
+            <a:r>
+              <a:rPr lang="zh-CN" altLang="en-US" dirty="0" smtClean="0"/>
+              <a:t>对与</a:t>
+            </a:r>
+            <a:r>
+              <a:rPr lang="en-US" altLang="zh-CN" dirty="0" smtClean="0"/>
+              <a:t>DLL</a:t>
+            </a:r>
+            <a:r>
+              <a:rPr lang="zh-CN" altLang="en-US" dirty="0" smtClean="0"/>
+              <a:t>文件的访问，可以在初始化</a:t>
+            </a:r>
+            <a:r>
+              <a:rPr lang="en-US" altLang="zh-CN" dirty="0" smtClean="0"/>
+              <a:t>DLL</a:t>
+            </a:r>
+            <a:r>
+              <a:rPr lang="zh-CN" altLang="en-US" dirty="0" smtClean="0"/>
+              <a:t>中类的时候进行，而不是以强制引用的方式包含在项目中</a:t>
+            </a:r>
+            <a:endParaRPr lang="en-US" altLang="zh-CN" dirty="0" smtClean="0"/>
           </a:p>
         </p:txBody>
       </p:sp>
     </p:spTree>
+    <p:extLst>
+      <p:ext uri="{BB962C8B-B14F-4D97-AF65-F5344CB8AC3E}">
+        <p14:creationId xmlns:p14="http://schemas.microsoft.com/office/powerpoint/2010/main" val="3295385214"/>
+      </p:ext>
+    </p:extLst>
   </p:cSld>
   <p:clrMapOvr>
     <a:masterClrMapping/>
@@ -4684,8 +6975,12 @@
           <a:lstStyle/>
           <a:p>
             <a:r>
-              <a:rPr lang="zh-CN" altLang="en-US" dirty="0" smtClean="0"/>
-              <a:t>数据连接层</a:t>
+              <a:rPr lang="en-US" altLang="zh-CN" dirty="0" err="1" smtClean="0"/>
+              <a:t>DALFactory</a:t>
+            </a:r>
+            <a:r>
+              <a:rPr lang="en-US" altLang="zh-CN" dirty="0" smtClean="0"/>
+              <a:t> Class</a:t>
             </a:r>
             <a:endParaRPr lang="zh-CN" altLang="en-US" dirty="0"/>
           </a:p>
@@ -4701,54 +6996,524 @@
             <p:ph idx="1"/>
           </p:nvPr>
         </p:nvSpPr>
-        <p:spPr/>
-        <p:txBody>
-          <a:bodyPr/>
-          <a:lstStyle/>
-          <a:p>
-            <a:r>
-              <a:rPr lang="en-US" altLang="zh-CN" dirty="0" smtClean="0"/>
-              <a:t>IDAL</a:t>
-            </a:r>
-          </a:p>
-          <a:p>
-            <a:pPr lvl="1"/>
-            <a:r>
-              <a:rPr lang="en-US" altLang="zh-CN" dirty="0" err="1" smtClean="0"/>
-              <a:t>SQLiteDAL</a:t>
-            </a:r>
-            <a:endParaRPr lang="en-US" altLang="zh-CN" dirty="0" smtClean="0"/>
-          </a:p>
-          <a:p>
-            <a:pPr lvl="1"/>
-            <a:r>
-              <a:rPr lang="en-US" altLang="zh-CN" dirty="0" err="1" smtClean="0"/>
-              <a:t>OracleDAL</a:t>
-            </a:r>
-            <a:endParaRPr lang="en-US" altLang="zh-CN" dirty="0" smtClean="0"/>
-          </a:p>
-          <a:p>
-            <a:r>
-              <a:rPr lang="en-US" altLang="zh-CN" dirty="0" err="1" smtClean="0"/>
-              <a:t>DbUtil</a:t>
-            </a:r>
-            <a:endParaRPr lang="en-US" altLang="zh-CN" dirty="0" smtClean="0"/>
-          </a:p>
-          <a:p>
-            <a:pPr lvl="1"/>
-            <a:r>
-              <a:rPr lang="en-US" altLang="zh-CN" dirty="0" err="1" smtClean="0"/>
-              <a:t>DbFactory</a:t>
-            </a:r>
-            <a:endParaRPr lang="en-US" altLang="zh-CN" dirty="0" smtClean="0"/>
-          </a:p>
-          <a:p>
-            <a:pPr lvl="1"/>
-            <a:endParaRPr lang="zh-CN" altLang="en-US" dirty="0"/>
+        <p:spPr>
+          <a:xfrm>
+            <a:off x="467544" y="1935480"/>
+            <a:ext cx="8208912" cy="4661872"/>
+          </a:xfrm>
+        </p:spPr>
+        <p:txBody>
+          <a:bodyPr>
+            <a:noAutofit/>
+          </a:bodyPr>
+          <a:lstStyle/>
+          <a:p>
+            <a:pPr marL="0" indent="0">
+              <a:buNone/>
+            </a:pPr>
+            <a:r>
+              <a:rPr lang="en-US" altLang="zh-CN" sz="1400" dirty="0" smtClean="0"/>
+              <a:t>private </a:t>
+            </a:r>
+            <a:r>
+              <a:rPr lang="en-US" altLang="zh-CN" sz="1400" dirty="0"/>
+              <a:t>static </a:t>
+            </a:r>
+            <a:r>
+              <a:rPr lang="en-US" altLang="zh-CN" sz="1400" dirty="0" err="1"/>
+              <a:t>readonly</a:t>
+            </a:r>
+            <a:r>
+              <a:rPr lang="en-US" altLang="zh-CN" sz="1400" dirty="0"/>
+              <a:t> string DAL = </a:t>
+            </a:r>
+            <a:r>
+              <a:rPr lang="en-US" altLang="zh-CN" sz="1400" dirty="0" err="1"/>
+              <a:t>ConfigurationManager.AppSettings</a:t>
+            </a:r>
+            <a:r>
+              <a:rPr lang="en-US" altLang="zh-CN" sz="1400" dirty="0"/>
+              <a:t>["DAL"];</a:t>
+            </a:r>
+          </a:p>
+          <a:p>
+            <a:pPr marL="0" indent="0">
+              <a:buNone/>
+            </a:pPr>
+            <a:r>
+              <a:rPr lang="en-US" altLang="zh-CN" sz="1400" dirty="0" smtClean="0"/>
+              <a:t>private </a:t>
+            </a:r>
+            <a:r>
+              <a:rPr lang="en-US" altLang="zh-CN" sz="1400" dirty="0"/>
+              <a:t>static </a:t>
+            </a:r>
+            <a:r>
+              <a:rPr lang="en-US" altLang="zh-CN" sz="1400" dirty="0" err="1"/>
+              <a:t>readonly</a:t>
+            </a:r>
+            <a:r>
+              <a:rPr lang="en-US" altLang="zh-CN" sz="1400" dirty="0"/>
+              <a:t> string BLOG_DAL </a:t>
+            </a:r>
+            <a:r>
+              <a:rPr lang="en-US" altLang="zh-CN" sz="1400" dirty="0" smtClean="0"/>
+              <a:t>= </a:t>
+            </a:r>
+            <a:r>
+              <a:rPr lang="en-US" altLang="zh-CN" sz="1400" dirty="0" err="1" smtClean="0"/>
+              <a:t>ConfigurationManager.AppSettings</a:t>
+            </a:r>
+            <a:r>
+              <a:rPr lang="en-US" altLang="zh-CN" sz="1400" dirty="0"/>
+              <a:t>["BLOG_DAL</a:t>
+            </a:r>
+            <a:r>
+              <a:rPr lang="en-US" altLang="zh-CN" sz="1400" dirty="0" smtClean="0"/>
+              <a:t>"];</a:t>
+            </a:r>
+          </a:p>
+          <a:p>
+            <a:pPr marL="0" indent="0">
+              <a:buNone/>
+            </a:pPr>
+            <a:r>
+              <a:rPr lang="en-US" altLang="zh-CN" sz="1400" dirty="0" smtClean="0"/>
+              <a:t>…</a:t>
+            </a:r>
+            <a:endParaRPr lang="en-US" altLang="zh-CN" sz="1400" dirty="0"/>
+          </a:p>
+          <a:p>
+            <a:pPr marL="0" indent="0">
+              <a:buNone/>
+            </a:pPr>
+            <a:r>
+              <a:rPr lang="en-US" altLang="zh-CN" sz="1400" dirty="0" smtClean="0"/>
+              <a:t>public </a:t>
+            </a:r>
+            <a:r>
+              <a:rPr lang="en-US" altLang="zh-CN" sz="1400" dirty="0"/>
+              <a:t>static T </a:t>
+            </a:r>
+            <a:r>
+              <a:rPr lang="en-US" altLang="zh-CN" sz="1400" dirty="0" err="1"/>
+              <a:t>CreateDAL</a:t>
+            </a:r>
+            <a:r>
+              <a:rPr lang="en-US" altLang="zh-CN" sz="1400" dirty="0"/>
+              <a:t>&lt;T&gt;() where T : </a:t>
+            </a:r>
+            <a:r>
+              <a:rPr lang="en-US" altLang="zh-CN" sz="1400" dirty="0" err="1"/>
+              <a:t>IBaseDAL</a:t>
+            </a:r>
+            <a:endParaRPr lang="en-US" altLang="zh-CN" sz="1400" dirty="0"/>
+          </a:p>
+          <a:p>
+            <a:pPr marL="0" indent="0">
+              <a:buNone/>
+            </a:pPr>
+            <a:r>
+              <a:rPr lang="en-US" altLang="zh-CN" sz="1400" dirty="0" smtClean="0"/>
+              <a:t>{</a:t>
+            </a:r>
+            <a:endParaRPr lang="en-US" altLang="zh-CN" sz="1400" dirty="0"/>
+          </a:p>
+          <a:p>
+            <a:pPr marL="0" indent="0">
+              <a:buNone/>
+            </a:pPr>
+            <a:r>
+              <a:rPr lang="en-US" altLang="zh-CN" sz="1400" dirty="0" smtClean="0"/>
+              <a:t>    T </a:t>
+            </a:r>
+            <a:r>
+              <a:rPr lang="en-US" altLang="zh-CN" sz="1400" dirty="0" err="1"/>
+              <a:t>t</a:t>
+            </a:r>
+            <a:r>
+              <a:rPr lang="en-US" altLang="zh-CN" sz="1400" dirty="0"/>
+              <a:t>; </a:t>
+            </a:r>
+            <a:endParaRPr lang="en-US" altLang="zh-CN" sz="1400" dirty="0" smtClean="0"/>
+          </a:p>
+          <a:p>
+            <a:pPr marL="0" indent="0">
+              <a:buNone/>
+            </a:pPr>
+            <a:r>
+              <a:rPr lang="en-US" altLang="zh-CN" sz="1400" dirty="0"/>
+              <a:t> </a:t>
+            </a:r>
+            <a:r>
+              <a:rPr lang="en-US" altLang="zh-CN" sz="1400" dirty="0" smtClean="0"/>
+              <a:t>   Type </a:t>
+            </a:r>
+            <a:r>
+              <a:rPr lang="en-US" altLang="zh-CN" sz="1400" dirty="0" err="1"/>
+              <a:t>type</a:t>
+            </a:r>
+            <a:r>
+              <a:rPr lang="en-US" altLang="zh-CN" sz="1400" dirty="0"/>
+              <a:t> = </a:t>
+            </a:r>
+            <a:r>
+              <a:rPr lang="en-US" altLang="zh-CN" sz="1400" dirty="0" err="1"/>
+              <a:t>typeof</a:t>
+            </a:r>
+            <a:r>
+              <a:rPr lang="en-US" altLang="zh-CN" sz="1400" dirty="0"/>
+              <a:t>(T</a:t>
+            </a:r>
+            <a:r>
+              <a:rPr lang="en-US" altLang="zh-CN" sz="1400" dirty="0" smtClean="0"/>
+              <a:t>);</a:t>
+            </a:r>
+            <a:endParaRPr lang="zh-CN" altLang="en-US" sz="1400" dirty="0"/>
+          </a:p>
+          <a:p>
+            <a:pPr marL="0" indent="0">
+              <a:buNone/>
+            </a:pPr>
+            <a:r>
+              <a:rPr lang="en-US" altLang="zh-CN" sz="1400" dirty="0" smtClean="0"/>
+              <a:t>    if </a:t>
+            </a:r>
+            <a:r>
+              <a:rPr lang="en-US" altLang="zh-CN" sz="1400" dirty="0"/>
+              <a:t>(</a:t>
+            </a:r>
+            <a:r>
+              <a:rPr lang="en-US" altLang="zh-CN" sz="1400" dirty="0" err="1"/>
+              <a:t>type.Equals</a:t>
+            </a:r>
+            <a:r>
+              <a:rPr lang="en-US" altLang="zh-CN" sz="1400" dirty="0"/>
+              <a:t>(</a:t>
+            </a:r>
+            <a:r>
+              <a:rPr lang="en-US" altLang="zh-CN" sz="1400" dirty="0" err="1"/>
+              <a:t>typeof</a:t>
+            </a:r>
+            <a:r>
+              <a:rPr lang="en-US" altLang="zh-CN" sz="1400" dirty="0"/>
+              <a:t>(</a:t>
+            </a:r>
+            <a:r>
+              <a:rPr lang="en-US" altLang="zh-CN" sz="1400" dirty="0" err="1"/>
+              <a:t>IBlogDAL</a:t>
+            </a:r>
+            <a:r>
+              <a:rPr lang="en-US" altLang="zh-CN" sz="1400" dirty="0"/>
+              <a:t>)))</a:t>
+            </a:r>
+          </a:p>
+          <a:p>
+            <a:pPr marL="0" indent="0">
+              <a:buNone/>
+            </a:pPr>
+            <a:r>
+              <a:rPr lang="zh-CN" altLang="en-US" sz="1400" dirty="0"/>
+              <a:t>    </a:t>
+            </a:r>
+            <a:r>
+              <a:rPr lang="en-US" altLang="zh-CN" sz="1400" dirty="0" smtClean="0"/>
+              <a:t>{</a:t>
+            </a:r>
+            <a:endParaRPr lang="en-US" altLang="zh-CN" sz="1400" dirty="0"/>
+          </a:p>
+          <a:p>
+            <a:pPr marL="0" indent="0">
+              <a:buNone/>
+            </a:pPr>
+            <a:r>
+              <a:rPr lang="en-US" altLang="zh-CN" sz="1400" dirty="0" smtClean="0"/>
+              <a:t>        t </a:t>
+            </a:r>
+            <a:r>
+              <a:rPr lang="en-US" altLang="zh-CN" sz="1400" dirty="0"/>
+              <a:t>= (T)</a:t>
+            </a:r>
+            <a:r>
+              <a:rPr lang="en-US" altLang="zh-CN" sz="1400" dirty="0" err="1"/>
+              <a:t>Assembly.Load</a:t>
+            </a:r>
+            <a:r>
+              <a:rPr lang="en-US" altLang="zh-CN" sz="1400" dirty="0"/>
+              <a:t>(DAL).</a:t>
+            </a:r>
+            <a:r>
+              <a:rPr lang="en-US" altLang="zh-CN" sz="1400" dirty="0" err="1"/>
+              <a:t>CreateInstance</a:t>
+            </a:r>
+            <a:r>
+              <a:rPr lang="en-US" altLang="zh-CN" sz="1400" dirty="0"/>
+              <a:t>(BLOG_DAL);</a:t>
+            </a:r>
+          </a:p>
+          <a:p>
+            <a:pPr marL="0" indent="0">
+              <a:buNone/>
+            </a:pPr>
+            <a:r>
+              <a:rPr lang="zh-CN" altLang="en-US" sz="1400" dirty="0" smtClean="0"/>
+              <a:t>    </a:t>
+            </a:r>
+            <a:r>
+              <a:rPr lang="en-US" altLang="zh-CN" sz="1400" dirty="0" smtClean="0"/>
+              <a:t>}</a:t>
+            </a:r>
+            <a:endParaRPr lang="en-US" altLang="zh-CN" sz="1400" dirty="0"/>
+          </a:p>
+          <a:p>
+            <a:pPr marL="0" indent="0">
+              <a:buNone/>
+            </a:pPr>
+            <a:r>
+              <a:rPr lang="en-US" altLang="zh-CN" sz="1400" dirty="0" smtClean="0"/>
+              <a:t>    else </a:t>
+            </a:r>
+            <a:r>
+              <a:rPr lang="en-US" altLang="zh-CN" sz="1400" dirty="0"/>
+              <a:t>if (</a:t>
+            </a:r>
+            <a:r>
+              <a:rPr lang="en-US" altLang="zh-CN" sz="1400" dirty="0" err="1"/>
+              <a:t>type.Equals</a:t>
+            </a:r>
+            <a:r>
+              <a:rPr lang="en-US" altLang="zh-CN" sz="1400" dirty="0"/>
+              <a:t>(</a:t>
+            </a:r>
+            <a:r>
+              <a:rPr lang="en-US" altLang="zh-CN" sz="1400" dirty="0" err="1"/>
+              <a:t>typeof</a:t>
+            </a:r>
+            <a:r>
+              <a:rPr lang="en-US" altLang="zh-CN" sz="1400" dirty="0"/>
+              <a:t>(</a:t>
+            </a:r>
+            <a:r>
+              <a:rPr lang="en-US" altLang="zh-CN" sz="1400" dirty="0" err="1"/>
+              <a:t>ICityDAL</a:t>
+            </a:r>
+            <a:r>
+              <a:rPr lang="en-US" altLang="zh-CN" sz="1400" dirty="0"/>
+              <a:t>)))</a:t>
+            </a:r>
+          </a:p>
+          <a:p>
+            <a:pPr marL="0" indent="0">
+              <a:buNone/>
+            </a:pPr>
+            <a:r>
+              <a:rPr lang="zh-CN" altLang="en-US" sz="1400" dirty="0" smtClean="0"/>
+              <a:t>    </a:t>
+            </a:r>
+            <a:r>
+              <a:rPr lang="en-US" altLang="zh-CN" sz="1400" dirty="0"/>
+              <a:t>{</a:t>
+            </a:r>
+          </a:p>
+          <a:p>
+            <a:pPr marL="0" indent="0">
+              <a:buNone/>
+            </a:pPr>
+            <a:r>
+              <a:rPr lang="en-US" altLang="zh-CN" sz="1400" dirty="0" smtClean="0"/>
+              <a:t>        t </a:t>
+            </a:r>
+            <a:r>
+              <a:rPr lang="en-US" altLang="zh-CN" sz="1400" dirty="0"/>
+              <a:t>= (T)</a:t>
+            </a:r>
+            <a:r>
+              <a:rPr lang="en-US" altLang="zh-CN" sz="1400" dirty="0" err="1"/>
+              <a:t>Assembly.Load</a:t>
+            </a:r>
+            <a:r>
+              <a:rPr lang="en-US" altLang="zh-CN" sz="1400" dirty="0"/>
+              <a:t>(DAL).</a:t>
+            </a:r>
+            <a:r>
+              <a:rPr lang="en-US" altLang="zh-CN" sz="1400" dirty="0" err="1"/>
+              <a:t>CreateInstance</a:t>
+            </a:r>
+            <a:r>
+              <a:rPr lang="en-US" altLang="zh-CN" sz="1400" dirty="0"/>
+              <a:t>(CITY_DAL);</a:t>
+            </a:r>
+          </a:p>
+          <a:p>
+            <a:pPr marL="0" indent="0">
+              <a:buNone/>
+            </a:pPr>
+            <a:r>
+              <a:rPr lang="zh-CN" altLang="en-US" sz="1400" dirty="0" smtClean="0"/>
+              <a:t>    </a:t>
+            </a:r>
+            <a:r>
+              <a:rPr lang="en-US" altLang="zh-CN" sz="1400" dirty="0" smtClean="0"/>
+              <a:t>}</a:t>
+            </a:r>
+          </a:p>
+          <a:p>
+            <a:pPr marL="0" indent="0">
+              <a:buNone/>
+            </a:pPr>
+            <a:r>
+              <a:rPr lang="en-US" altLang="zh-CN" sz="1400" dirty="0"/>
+              <a:t> </a:t>
+            </a:r>
+            <a:r>
+              <a:rPr lang="en-US" altLang="zh-CN" sz="1400" dirty="0" smtClean="0"/>
+              <a:t>   …</a:t>
+            </a:r>
+          </a:p>
+          <a:p>
+            <a:pPr marL="0" indent="0">
+              <a:buNone/>
+            </a:pPr>
+            <a:r>
+              <a:rPr lang="en-US" altLang="zh-CN" sz="1400" dirty="0"/>
+              <a:t> </a:t>
+            </a:r>
+            <a:r>
+              <a:rPr lang="en-US" altLang="zh-CN" sz="1400" dirty="0" smtClean="0"/>
+              <a:t>   return t;</a:t>
+            </a:r>
+          </a:p>
+          <a:p>
+            <a:pPr marL="0" indent="0">
+              <a:buNone/>
+            </a:pPr>
+            <a:r>
+              <a:rPr lang="en-US" altLang="zh-CN" sz="1400" dirty="0" smtClean="0"/>
+              <a:t>}</a:t>
+            </a:r>
+            <a:endParaRPr lang="zh-CN" altLang="en-US" sz="1400" dirty="0"/>
+          </a:p>
+        </p:txBody>
+      </p:sp>
+      <p:sp>
+        <p:nvSpPr>
+          <p:cNvPr id="4" name="TextBox 3"/>
+          <p:cNvSpPr txBox="1"/>
+          <p:nvPr/>
+        </p:nvSpPr>
+        <p:spPr>
+          <a:xfrm>
+            <a:off x="1979712" y="5661248"/>
+            <a:ext cx="6939925" cy="923330"/>
+          </a:xfrm>
+          <a:prstGeom prst="rect">
+            <a:avLst/>
+          </a:prstGeom>
+        </p:spPr>
+        <p:style>
+          <a:lnRef idx="3">
+            <a:schemeClr val="lt1"/>
+          </a:lnRef>
+          <a:fillRef idx="1">
+            <a:schemeClr val="accent1"/>
+          </a:fillRef>
+          <a:effectRef idx="1">
+            <a:schemeClr val="accent1"/>
+          </a:effectRef>
+          <a:fontRef idx="minor">
+            <a:schemeClr val="lt1"/>
+          </a:fontRef>
+        </p:style>
+        <p:txBody>
+          <a:bodyPr wrap="square" rtlCol="0">
+            <a:spAutoFit/>
+          </a:bodyPr>
+          <a:lstStyle/>
+          <a:p>
+            <a:r>
+              <a:rPr lang="zh-CN" altLang="en-US" b="1" dirty="0">
+                <a:latin typeface="新宋体" pitchFamily="49" charset="-122"/>
+                <a:ea typeface="新宋体" pitchFamily="49" charset="-122"/>
+              </a:rPr>
+              <a:t>配置文件</a:t>
+            </a:r>
+            <a:endParaRPr lang="en-US" altLang="zh-CN" b="1" dirty="0" smtClean="0">
+              <a:latin typeface="新宋体" pitchFamily="49" charset="-122"/>
+              <a:ea typeface="新宋体" pitchFamily="49" charset="-122"/>
+            </a:endParaRPr>
+          </a:p>
+          <a:p>
+            <a:r>
+              <a:rPr lang="en-US" altLang="zh-CN" b="1" dirty="0" smtClean="0">
+                <a:latin typeface="新宋体" pitchFamily="49" charset="-122"/>
+                <a:ea typeface="新宋体" pitchFamily="49" charset="-122"/>
+              </a:rPr>
+              <a:t>&lt;add </a:t>
+            </a:r>
+            <a:r>
+              <a:rPr lang="en-US" altLang="zh-CN" b="1" dirty="0">
+                <a:latin typeface="新宋体" pitchFamily="49" charset="-122"/>
+                <a:ea typeface="新宋体" pitchFamily="49" charset="-122"/>
+              </a:rPr>
+              <a:t>key="DAL" value="</a:t>
+            </a:r>
+            <a:r>
+              <a:rPr lang="en-US" altLang="zh-CN" b="1" dirty="0" err="1">
+                <a:latin typeface="新宋体" pitchFamily="49" charset="-122"/>
+                <a:ea typeface="新宋体" pitchFamily="49" charset="-122"/>
+              </a:rPr>
+              <a:t>SextantTG.SQLiteDAL</a:t>
+            </a:r>
+            <a:r>
+              <a:rPr lang="en-US" altLang="zh-CN" b="1" dirty="0">
+                <a:latin typeface="新宋体" pitchFamily="49" charset="-122"/>
+                <a:ea typeface="新宋体" pitchFamily="49" charset="-122"/>
+              </a:rPr>
+              <a:t>" /&gt;</a:t>
+            </a:r>
+          </a:p>
+          <a:p>
+            <a:r>
+              <a:rPr lang="en-US" altLang="zh-CN" b="1" dirty="0" smtClean="0">
+                <a:latin typeface="新宋体" pitchFamily="49" charset="-122"/>
+                <a:ea typeface="新宋体" pitchFamily="49" charset="-122"/>
+              </a:rPr>
+              <a:t>&lt;</a:t>
+            </a:r>
+            <a:r>
+              <a:rPr lang="en-US" altLang="zh-CN" b="1" dirty="0">
+                <a:latin typeface="新宋体" pitchFamily="49" charset="-122"/>
+                <a:ea typeface="新宋体" pitchFamily="49" charset="-122"/>
+              </a:rPr>
+              <a:t>add key="BLOG_DAL" value="</a:t>
+            </a:r>
+            <a:r>
+              <a:rPr lang="en-US" altLang="zh-CN" b="1" dirty="0" err="1">
+                <a:latin typeface="新宋体" pitchFamily="49" charset="-122"/>
+                <a:ea typeface="新宋体" pitchFamily="49" charset="-122"/>
+              </a:rPr>
+              <a:t>SextantTG.SQLiteDAL.BlogDAL</a:t>
+            </a:r>
+            <a:r>
+              <a:rPr lang="en-US" altLang="zh-CN" b="1" dirty="0">
+                <a:latin typeface="新宋体" pitchFamily="49" charset="-122"/>
+                <a:ea typeface="新宋体" pitchFamily="49" charset="-122"/>
+              </a:rPr>
+              <a:t>" /&gt;</a:t>
+            </a:r>
+            <a:endParaRPr lang="zh-CN" altLang="en-US" b="1" dirty="0">
+              <a:latin typeface="新宋体" pitchFamily="49" charset="-122"/>
+              <a:ea typeface="新宋体" pitchFamily="49" charset="-122"/>
+            </a:endParaRPr>
           </a:p>
         </p:txBody>
       </p:sp>
     </p:spTree>
+    <p:extLst>
+      <p:ext uri="{BB962C8B-B14F-4D97-AF65-F5344CB8AC3E}">
+        <p14:creationId xmlns:p14="http://schemas.microsoft.com/office/powerpoint/2010/main" val="207804010"/>
+      </p:ext>
+    </p:extLst>
   </p:cSld>
   <p:clrMapOvr>
     <a:masterClrMapping/>
@@ -4790,23 +7555,7 @@
           <a:p>
             <a:r>
               <a:rPr lang="zh-CN" altLang="en-US" dirty="0" smtClean="0"/>
-              <a:t>服务</a:t>
-            </a:r>
-            <a:r>
-              <a:rPr lang="en-US" altLang="zh-CN" dirty="0" smtClean="0"/>
-              <a:t>(</a:t>
-            </a:r>
-            <a:r>
-              <a:rPr lang="zh-CN" altLang="en-US" dirty="0" smtClean="0"/>
-              <a:t>业务</a:t>
-            </a:r>
-            <a:r>
-              <a:rPr lang="en-US" altLang="zh-CN" dirty="0" smtClean="0"/>
-              <a:t>)</a:t>
-            </a:r>
-            <a:r>
-              <a:rPr lang="zh-CN" altLang="en-US" dirty="0" smtClean="0"/>
-              <a:t>层</a:t>
+              <a:t>数据连接层</a:t>
             </a:r>
             <a:endParaRPr lang="zh-CN" altLang="en-US" dirty="0"/>
           </a:p>
@@ -4828,18 +7577,116 @@
           <a:lstStyle/>
           <a:p>
             <a:r>
+              <a:rPr lang="en-US" altLang="zh-CN" dirty="0" smtClean="0"/>
+              <a:t>IDAL</a:t>
+            </a:r>
+          </a:p>
+          <a:p>
+            <a:pPr lvl="1"/>
+            <a:r>
               <a:rPr lang="en-US" altLang="zh-CN" dirty="0" err="1" smtClean="0"/>
-              <a:t>IService</a:t>
+              <a:t>SQLiteDAL</a:t>
             </a:r>
             <a:endParaRPr lang="en-US" altLang="zh-CN" dirty="0" smtClean="0"/>
           </a:p>
           <a:p>
             <a:pPr lvl="1"/>
             <a:r>
-              <a:rPr lang="en-US" altLang="zh-CN" dirty="0" smtClean="0"/>
-              <a:t>Service</a:t>
-            </a:r>
-            <a:endParaRPr lang="zh-CN" altLang="en-US" dirty="0"/>
+              <a:rPr lang="en-US" altLang="zh-CN" dirty="0" err="1" smtClean="0"/>
+              <a:t>OracleDAL</a:t>
+            </a:r>
+            <a:endParaRPr lang="en-US" altLang="zh-CN" dirty="0" smtClean="0"/>
+          </a:p>
+          <a:p>
+            <a:pPr lvl="1"/>
+            <a:r>
+              <a:rPr lang="zh-CN" altLang="en-US" dirty="0"/>
+              <a:t>一个</a:t>
+            </a:r>
+            <a:r>
+              <a:rPr lang="zh-CN" altLang="en-US" dirty="0" smtClean="0"/>
+              <a:t>接口、两个实现，支持不同底层数据库。</a:t>
+            </a:r>
+            <a:endParaRPr lang="en-US" altLang="zh-CN" dirty="0" smtClean="0"/>
+          </a:p>
+          <a:p>
+            <a:r>
+              <a:rPr lang="en-US" altLang="zh-CN" dirty="0" err="1" smtClean="0"/>
+              <a:t>DbUtil</a:t>
+            </a:r>
+            <a:endParaRPr lang="en-US" altLang="zh-CN" dirty="0" smtClean="0"/>
+          </a:p>
+          <a:p>
+            <a:pPr lvl="1"/>
+            <a:r>
+              <a:rPr lang="en-US" altLang="zh-CN" dirty="0" err="1" smtClean="0"/>
+              <a:t>DbFactory</a:t>
+            </a:r>
+            <a:endParaRPr lang="en-US" altLang="zh-CN" dirty="0" smtClean="0"/>
+          </a:p>
+          <a:p>
+            <a:pPr lvl="1"/>
+            <a:r>
+              <a:rPr lang="zh-CN" altLang="en-US" dirty="0" smtClean="0"/>
+              <a:t>充分利用</a:t>
+            </a:r>
+            <a:r>
+              <a:rPr lang="en-US" altLang="zh-CN" dirty="0" smtClean="0"/>
+              <a:t>.NET</a:t>
+            </a:r>
+            <a:r>
+              <a:rPr lang="zh-CN" altLang="en-US" dirty="0" smtClean="0"/>
+              <a:t>内置的设计模式，支持不同数据库驱动方式（</a:t>
+            </a:r>
+            <a:r>
+              <a:rPr lang="en-US" altLang="zh-CN" dirty="0" err="1" smtClean="0"/>
+              <a:t>OleDb</a:t>
+            </a:r>
+            <a:r>
+              <a:rPr lang="zh-CN" altLang="en-US" dirty="0"/>
+              <a:t>、</a:t>
+            </a:r>
+            <a:r>
+              <a:rPr lang="en-US" altLang="zh-CN" dirty="0" smtClean="0"/>
+              <a:t>ODBC</a:t>
+            </a:r>
+            <a:r>
+              <a:rPr lang="zh-CN" altLang="en-US" dirty="0" smtClean="0"/>
+              <a:t>、</a:t>
+            </a:r>
+            <a:r>
+              <a:rPr lang="en-US" altLang="zh-CN" dirty="0"/>
+              <a:t> Oracle </a:t>
+            </a:r>
+            <a:r>
+              <a:rPr lang="zh-CN" altLang="en-US" dirty="0" smtClean="0"/>
+              <a:t>、</a:t>
+            </a:r>
+            <a:r>
+              <a:rPr lang="en-US" altLang="zh-CN" dirty="0" err="1" smtClean="0"/>
+              <a:t>OracleClient</a:t>
+            </a:r>
+            <a:r>
+              <a:rPr lang="zh-CN" altLang="en-US" dirty="0" smtClean="0"/>
+              <a:t>、</a:t>
+            </a:r>
+            <a:r>
+              <a:rPr lang="en-US" altLang="zh-CN" dirty="0" err="1" smtClean="0"/>
+              <a:t>Devart</a:t>
+            </a:r>
+            <a:r>
+              <a:rPr lang="zh-CN" altLang="en-US" dirty="0" smtClean="0"/>
+              <a:t>、</a:t>
+            </a:r>
+            <a:r>
+              <a:rPr lang="en-US" altLang="zh-CN" dirty="0" smtClean="0"/>
+              <a:t>SQLite.NET</a:t>
+            </a:r>
+            <a:r>
+              <a:rPr lang="zh-CN" altLang="en-US" dirty="0" smtClean="0"/>
+              <a:t>）</a:t>
+            </a:r>
+            <a:endParaRPr lang="en-US" altLang="zh-CN" dirty="0" smtClean="0"/>
           </a:p>
         </p:txBody>
       </p:sp>
@@ -4885,11 +7732,23 @@
           <a:p>
             <a:r>
               <a:rPr lang="zh-CN" altLang="en-US" dirty="0" smtClean="0"/>
-              <a:t>用户</a:t>
-            </a:r>
-            <a:r>
-              <a:rPr lang="zh-CN" altLang="en-US" dirty="0" smtClean="0"/>
-              <a:t>界面层</a:t>
+              <a:t>服务</a:t>
+            </a:r>
+            <a:r>
+              <a:rPr lang="en-US" altLang="zh-CN" dirty="0" smtClean="0"/>
+              <a:t>(</a:t>
+            </a:r>
+            <a:r>
+              <a:rPr lang="zh-CN" altLang="en-US" dirty="0" smtClean="0"/>
+              <a:t>业务</a:t>
+            </a:r>
+            <a:r>
+              <a:rPr lang="en-US" altLang="zh-CN" dirty="0" smtClean="0"/>
+              <a:t>)</a:t>
+            </a:r>
+            <a:r>
+              <a:rPr lang="zh-CN" altLang="en-US" dirty="0" smtClean="0"/>
+              <a:t>层</a:t>
             </a:r>
             <a:endParaRPr lang="zh-CN" altLang="en-US" dirty="0"/>
           </a:p>
@@ -4912,13 +7771,57 @@
           <a:p>
             <a:r>
               <a:rPr lang="en-US" altLang="zh-CN" dirty="0" err="1" smtClean="0"/>
-              <a:t>WinForm</a:t>
-            </a:r>
-            <a:r>
-              <a:rPr lang="en-US" altLang="zh-CN" dirty="0" smtClean="0"/>
-              <a:t> Control</a:t>
-            </a:r>
-            <a:endParaRPr lang="zh-CN" altLang="en-US" dirty="0"/>
+              <a:t>IService</a:t>
+            </a:r>
+            <a:endParaRPr lang="en-US" altLang="zh-CN" dirty="0" smtClean="0"/>
+          </a:p>
+          <a:p>
+            <a:pPr lvl="1"/>
+            <a:r>
+              <a:rPr lang="en-US" altLang="zh-CN" dirty="0" smtClean="0"/>
+              <a:t>Service</a:t>
+            </a:r>
+            <a:endParaRPr lang="en-US" altLang="zh-CN" dirty="0"/>
+          </a:p>
+          <a:p>
+            <a:r>
+              <a:rPr lang="en-US" altLang="zh-CN" dirty="0" smtClean="0"/>
+              <a:t>Web Service</a:t>
+            </a:r>
+          </a:p>
+          <a:p>
+            <a:r>
+              <a:rPr lang="en-US" altLang="zh-CN" dirty="0" smtClean="0"/>
+              <a:t>DTO</a:t>
+            </a:r>
+          </a:p>
+          <a:p>
+            <a:pPr lvl="1"/>
+            <a:r>
+              <a:rPr lang="en-US" altLang="zh-CN" dirty="0" smtClean="0"/>
+              <a:t>Android </a:t>
+            </a:r>
+            <a:r>
+              <a:rPr lang="en-US" altLang="zh-CN" dirty="0" err="1" smtClean="0"/>
+              <a:t>ListView</a:t>
+            </a:r>
+            <a:r>
+              <a:rPr lang="en-US" altLang="zh-CN" dirty="0" smtClean="0"/>
+              <a:t> Items</a:t>
+            </a:r>
+            <a:endParaRPr lang="en-US" altLang="zh-CN" dirty="0" smtClean="0"/>
+          </a:p>
+          <a:p>
+            <a:pPr lvl="1"/>
+            <a:r>
+              <a:rPr lang="en-US" altLang="zh-CN" dirty="0" smtClean="0"/>
+              <a:t>Object </a:t>
+            </a:r>
+            <a:r>
+              <a:rPr lang="en-US" altLang="zh-CN" dirty="0" err="1" smtClean="0"/>
+              <a:t>Detial</a:t>
+            </a:r>
+            <a:endParaRPr lang="en-US" altLang="zh-CN" dirty="0" smtClean="0"/>
           </a:p>
         </p:txBody>
       </p:sp>
@@ -5223,4 +8126,289 @@
   <a:objectDefaults/>
   <a:extraClrSchemeLst/>
 </a:theme>
+</file>
+
+<file path=ppt/theme/theme2.xml><?xml version="1.0" encoding="utf-8"?>
+<a:theme xmlns:a="http://schemas.openxmlformats.org/drawingml/2006/main" name="Office 主题​​">
+  <a:themeElements>
+    <a:clrScheme name="Office">
+      <a:dk1>
+        <a:sysClr val="windowText" lastClr="000000"/>
+      </a:dk1>
+      <a:lt1>
+        <a:sysClr val="window" lastClr="FFFFFF"/>
+      </a:lt1>
+      <a:dk2>
+        <a:srgbClr val="1F497D"/>
+      </a:dk2>
+      <a:lt2>
+        <a:srgbClr val="EEECE1"/>
+      </a:lt2>
+      <a:accent1>
+        <a:srgbClr val="4F81BD"/>
+      </a:accent1>
+      <a:accent2>
+        <a:srgbClr val="C0504D"/>
+      </a:accent2>
+      <a:accent3>
+        <a:srgbClr val="9BBB59"/>
+      </a:accent3>
+      <a:accent4>
+        <a:srgbClr val="8064A2"/>
+      </a:accent4>
+      <a:accent5>
+        <a:srgbClr val="4BACC6"/>
+      </a:accent5>
+      <a:accent6>
+        <a:srgbClr val="F79646"/>
+      </a:accent6>
+      <a:hlink>
+        <a:srgbClr val="0000FF"/>
+      </a:hlink>
+      <a:folHlink>
+        <a:srgbClr val="800080"/>
+      </a:folHlink>
+    </a:clrScheme>
+    <a:fontScheme name="Office">
+      <a:majorFont>
+        <a:latin typeface="Calibri"/>
+        <a:ea typeface=""/>
+        <a:cs typeface=""/>
+        <a:font script="Jpan" typeface="ＭＳ Ｐゴシック"/>
+        <a:font script="Hang" typeface="맑은 고딕"/>
+        <a:font script="Hans" typeface="宋体"/>
+        <a:font script="Hant" typeface="新細明體"/>
+        <a:font script="Arab" typeface="Times New Roman"/>
+        <a:font script="Hebr" typeface="Times New Roman"/>
+        <a:font script="Thai" typeface="Angsana New"/>
+        <a:font script="Ethi" typeface="Nyala"/>
+        <a:font script="Beng" typeface="Vrinda"/>
+        <a:font script="Gujr" typeface="Shruti"/>
+        <a:font script="Khmr" typeface="MoolBoran"/>
+        <a:font script="Knda" typeface="Tunga"/>
+        <a:font script="Guru" typeface="Raavi"/>
+        <a:font script="Cans" typeface="Euphemia"/>
+        <a:font script="Cher" typeface="Plantagenet Cherokee"/>
+        <a:font script="Yiii" typeface="Microsoft Yi Baiti"/>
+        <a:font script="Tibt" typeface="Microsoft Himalaya"/>
+        <a:font script="Thaa" typeface="MV Boli"/>
+        <a:font script="Deva" typeface="Mangal"/>
+        <a:font script="Telu" typeface="Gautami"/>
+        <a:font script="Taml" typeface="Latha"/>
+        <a:font script="Syrc" typeface="Estrangelo Edessa"/>
+        <a:font script="Orya" typeface="Kalinga"/>
+        <a:font script="Mlym" typeface="Kartika"/>
+        <a:font script="Laoo" typeface="DokChampa"/>
+        <a:font script="Sinh" typeface="Iskoola Pota"/>
+        <a:font script="Mong" typeface="Mongolian Baiti"/>
+        <a:font script="Viet" typeface="Times New Roman"/>
+        <a:font script="Uigh" typeface="Microsoft Uighur"/>
+        <a:font script="Geor" typeface="Sylfaen"/>
+      </a:majorFont>
+      <a:minorFont>
+        <a:latin typeface="Calibri"/>
+        <a:ea typeface=""/>
+        <a:cs typeface=""/>
+        <a:font script="Jpan" typeface="ＭＳ Ｐゴシック"/>
+        <a:font script="Hang" typeface="맑은 고딕"/>
+        <a:font script="Hans" typeface="宋体"/>
+        <a:font script="Hant" typeface="新細明體"/>
+        <a:font script="Arab" typeface="Arial"/>
+        <a:font script="Hebr" typeface="Arial"/>
+        <a:font script="Thai" typeface="Cordia New"/>
+        <a:font script="Ethi" typeface="Nyala"/>
+        <a:font script="Beng" typeface="Vrinda"/>
+        <a:font script="Gujr" typeface="Shruti"/>
+        <a:font script="Khmr" typeface="DaunPenh"/>
+        <a:font script="Knda" typeface="Tunga"/>
+        <a:font script="Guru" typeface="Raavi"/>
+        <a:font script="Cans" typeface="Euphemia"/>
+        <a:font script="Cher" typeface="Plantagenet Cherokee"/>
+        <a:font script="Yiii" typeface="Microsoft Yi Baiti"/>
+        <a:font script="Tibt" typeface="Microsoft Himalaya"/>
+        <a:font script="Thaa" typeface="MV Boli"/>
+        <a:font script="Deva" typeface="Mangal"/>
+        <a:font script="Telu" typeface="Gautami"/>
+        <a:font script="Taml" typeface="Latha"/>
+        <a:font script="Syrc" typeface="Estrangelo Edessa"/>
+        <a:font script="Orya" typeface="Kalinga"/>
+        <a:font script="Mlym" typeface="Kartika"/>
+        <a:font script="Laoo" typeface="DokChampa"/>
+        <a:font script="Sinh" typeface="Iskoola Pota"/>
+        <a:font script="Mong" typeface="Mongolian Baiti"/>
+        <a:font script="Viet" typeface="Arial"/>
+        <a:font script="Uigh" typeface="Microsoft Uighur"/>
+        <a:font script="Geor" typeface="Sylfaen"/>
+      </a:minorFont>
+    </a:fontScheme>
+    <a:fmtScheme name="Office">
+      <a:fillStyleLst>
+        <a:solidFill>
+          <a:schemeClr val="phClr"/>
+        </a:solidFill>
+        <a:gradFill rotWithShape="1">
+          <a:gsLst>
+            <a:gs pos="0">
+              <a:schemeClr val="phClr">
+                <a:tint val="50000"/>
+                <a:satMod val="300000"/>
+              </a:schemeClr>
+            </a:gs>
+            <a:gs pos="35000">
+              <a:schemeClr val="phClr">
+                <a:tint val="37000"/>
+                <a:satMod val="300000"/>
+              </a:schemeClr>
+            </a:gs>
+            <a:gs pos="100000">
+              <a:schemeClr val="phClr">
+                <a:tint val="15000"/>
+                <a:satMod val="350000"/>
+              </a:schemeClr>
+            </a:gs>
+          </a:gsLst>
+          <a:lin ang="16200000" scaled="1"/>
+        </a:gradFill>
+        <a:gradFill rotWithShape="1">
+          <a:gsLst>
+            <a:gs pos="0">
+              <a:schemeClr val="phClr">
+                <a:shade val="51000"/>
+                <a:satMod val="130000"/>
+              </a:schemeClr>
+            </a:gs>
+            <a:gs pos="80000">
+              <a:schemeClr val="phClr">
+                <a:shade val="93000"/>
+                <a:satMod val="130000"/>
+              </a:schemeClr>
+            </a:gs>
+            <a:gs pos="100000">
+              <a:schemeClr val="phClr">
+                <a:shade val="94000"/>
+                <a:satMod val="135000"/>
+              </a:schemeClr>
+            </a:gs>
+          </a:gsLst>
+          <a:lin ang="16200000" scaled="0"/>
+        </a:gradFill>
+      </a:fillStyleLst>
+      <a:lnStyleLst>
+        <a:ln w="9525" cap="flat" cmpd="sng" algn="ctr">
+          <a:solidFill>
+            <a:schemeClr val="phClr">
+              <a:shade val="95000"/>
+              <a:satMod val="105000"/>
+            </a:schemeClr>
+          </a:solidFill>
+          <a:prstDash val="solid"/>
+        </a:ln>
+        <a:ln w="25400" cap="flat" cmpd="sng" algn="ctr">
+          <a:solidFill>
+            <a:schemeClr val="phClr"/>
+          </a:solidFill>
+          <a:prstDash val="solid"/>
+        </a:ln>
+        <a:ln w="38100" cap="flat" cmpd="sng" algn="ctr">
+          <a:solidFill>
+            <a:schemeClr val="phClr"/>
+          </a:solidFill>
+          <a:prstDash val="solid"/>
+        </a:ln>
+      </a:lnStyleLst>
+      <a:effectStyleLst>
+        <a:effectStyle>
+          <a:effectLst>
+            <a:outerShdw blurRad="40000" dist="20000" dir="5400000" rotWithShape="0">
+              <a:srgbClr val="000000">
+                <a:alpha val="38000"/>
+              </a:srgbClr>
+            </a:outerShdw>
+          </a:effectLst>
+        </a:effectStyle>
+        <a:effectStyle>
+          <a:effectLst>
+            <a:outerShdw blurRad="40000" dist="23000" dir="5400000" rotWithShape="0">
+              <a:srgbClr val="000000">
+                <a:alpha val="35000"/>
+              </a:srgbClr>
+            </a:outerShdw>
+          </a:effectLst>
+        </a:effectStyle>
+        <a:effectStyle>
+          <a:effectLst>
+            <a:outerShdw blurRad="40000" dist="23000" dir="5400000" rotWithShape="0">
+              <a:srgbClr val="000000">
+                <a:alpha val="35000"/>
+              </a:srgbClr>
+            </a:outerShdw>
+          </a:effectLst>
+          <a:scene3d>
+            <a:camera prst="orthographicFront">
+              <a:rot lat="0" lon="0" rev="0"/>
+            </a:camera>
+            <a:lightRig rig="threePt" dir="t">
+              <a:rot lat="0" lon="0" rev="1200000"/>
+            </a:lightRig>
+          </a:scene3d>
+          <a:sp3d>
+            <a:bevelT w="63500" h="25400"/>
+          </a:sp3d>
+        </a:effectStyle>
+      </a:effectStyleLst>
+      <a:bgFillStyleLst>
+        <a:solidFill>
+          <a:schemeClr val="phClr"/>
+        </a:solidFill>
+        <a:gradFill rotWithShape="1">
+          <a:gsLst>
+            <a:gs pos="0">
+              <a:schemeClr val="phClr">
+                <a:tint val="40000"/>
+                <a:satMod val="350000"/>
+              </a:schemeClr>
+            </a:gs>
+            <a:gs pos="40000">
+              <a:schemeClr val="phClr">
+                <a:tint val="45000"/>
+                <a:shade val="99000"/>
+                <a:satMod val="350000"/>
+              </a:schemeClr>
+            </a:gs>
+            <a:gs pos="100000">
+              <a:schemeClr val="phClr">
+                <a:shade val="20000"/>
+                <a:satMod val="255000"/>
+              </a:schemeClr>
+            </a:gs>
+          </a:gsLst>
+          <a:path path="circle">
+            <a:fillToRect l="50000" t="-80000" r="50000" b="180000"/>
+          </a:path>
+        </a:gradFill>
+        <a:gradFill rotWithShape="1">
+          <a:gsLst>
+            <a:gs pos="0">
+              <a:schemeClr val="phClr">
+                <a:tint val="80000"/>
+                <a:satMod val="300000"/>
+              </a:schemeClr>
+            </a:gs>
+            <a:gs pos="100000">
+              <a:schemeClr val="phClr">
+                <a:shade val="30000"/>
+                <a:satMod val="200000"/>
+              </a:schemeClr>
+            </a:gs>
+          </a:gsLst>
+          <a:path path="circle">
+            <a:fillToRect l="50000" t="50000" r="50000" b="50000"/>
+          </a:path>
+        </a:gradFill>
+      </a:bgFillStyleLst>
+    </a:fmtScheme>
+  </a:themeElements>
+  <a:objectDefaults/>
+  <a:extraClrSchemeLst/>
+</a:theme>
 </file>
</xml_diff>